<commit_message>
Updated the code and slides for .NET 7
</commit_message>
<xml_diff>
--- a/WebApplicationFactory/NebraskaCode.pptx
+++ b/WebApplicationFactory/NebraskaCode.pptx
@@ -5,7 +5,7 @@
     <p:sldMasterId id="2147483648" r:id="rId1"/>
   </p:sldMasterIdLst>
   <p:notesMasterIdLst>
-    <p:notesMasterId r:id="rId21"/>
+    <p:notesMasterId r:id="rId24"/>
   </p:notesMasterIdLst>
   <p:sldIdLst>
     <p:sldId id="270" r:id="rId2"/>
@@ -16,17 +16,20 @@
     <p:sldId id="260" r:id="rId7"/>
     <p:sldId id="284" r:id="rId8"/>
     <p:sldId id="283" r:id="rId9"/>
-    <p:sldId id="306" r:id="rId10"/>
-    <p:sldId id="307" r:id="rId11"/>
-    <p:sldId id="308" r:id="rId12"/>
-    <p:sldId id="310" r:id="rId13"/>
-    <p:sldId id="309" r:id="rId14"/>
-    <p:sldId id="285" r:id="rId15"/>
-    <p:sldId id="305" r:id="rId16"/>
-    <p:sldId id="286" r:id="rId17"/>
-    <p:sldId id="288" r:id="rId18"/>
-    <p:sldId id="274" r:id="rId19"/>
-    <p:sldId id="282" r:id="rId20"/>
+    <p:sldId id="312" r:id="rId10"/>
+    <p:sldId id="313" r:id="rId11"/>
+    <p:sldId id="307" r:id="rId12"/>
+    <p:sldId id="285" r:id="rId13"/>
+    <p:sldId id="306" r:id="rId14"/>
+    <p:sldId id="314" r:id="rId15"/>
+    <p:sldId id="308" r:id="rId16"/>
+    <p:sldId id="305" r:id="rId17"/>
+    <p:sldId id="286" r:id="rId18"/>
+    <p:sldId id="310" r:id="rId19"/>
+    <p:sldId id="309" r:id="rId20"/>
+    <p:sldId id="288" r:id="rId21"/>
+    <p:sldId id="274" r:id="rId22"/>
+    <p:sldId id="282" r:id="rId23"/>
   </p:sldIdLst>
   <p:sldSz cx="12192000" cy="6858000"/>
   <p:notesSz cx="6858000" cy="9144000"/>
@@ -218,7 +221,7 @@
           <a:p>
             <a:fld id="{B234A0A9-D2B9-4D21-8054-CE3E8EA3318B}" type="datetimeFigureOut">
               <a:rPr lang="en-US" smtClean="0"/>
-              <a:t>7/8/2023</a:t>
+              <a:t>7/15/2023</a:t>
             </a:fld>
             <a:endParaRPr lang="en-US"/>
           </a:p>
@@ -800,7 +803,7 @@
           <a:p>
             <a:fld id="{0BDAA80A-DCF6-416C-B4E9-4897677234EE}" type="datetimeFigureOut">
               <a:rPr lang="en-US" smtClean="0"/>
-              <a:t>7/8/2023</a:t>
+              <a:t>7/15/2023</a:t>
             </a:fld>
             <a:endParaRPr lang="en-US"/>
           </a:p>
@@ -998,7 +1001,7 @@
           <a:p>
             <a:fld id="{0BDAA80A-DCF6-416C-B4E9-4897677234EE}" type="datetimeFigureOut">
               <a:rPr lang="en-US" smtClean="0"/>
-              <a:t>7/8/2023</a:t>
+              <a:t>7/15/2023</a:t>
             </a:fld>
             <a:endParaRPr lang="en-US"/>
           </a:p>
@@ -1206,7 +1209,7 @@
           <a:p>
             <a:fld id="{0BDAA80A-DCF6-416C-B4E9-4897677234EE}" type="datetimeFigureOut">
               <a:rPr lang="en-US" smtClean="0"/>
-              <a:t>7/8/2023</a:t>
+              <a:t>7/15/2023</a:t>
             </a:fld>
             <a:endParaRPr lang="en-US"/>
           </a:p>
@@ -1404,7 +1407,7 @@
           <a:p>
             <a:fld id="{0BDAA80A-DCF6-416C-B4E9-4897677234EE}" type="datetimeFigureOut">
               <a:rPr lang="en-US" smtClean="0"/>
-              <a:t>7/8/2023</a:t>
+              <a:t>7/15/2023</a:t>
             </a:fld>
             <a:endParaRPr lang="en-US"/>
           </a:p>
@@ -1679,7 +1682,7 @@
           <a:p>
             <a:fld id="{0BDAA80A-DCF6-416C-B4E9-4897677234EE}" type="datetimeFigureOut">
               <a:rPr lang="en-US" smtClean="0"/>
-              <a:t>7/8/2023</a:t>
+              <a:t>7/15/2023</a:t>
             </a:fld>
             <a:endParaRPr lang="en-US"/>
           </a:p>
@@ -1944,7 +1947,7 @@
           <a:p>
             <a:fld id="{0BDAA80A-DCF6-416C-B4E9-4897677234EE}" type="datetimeFigureOut">
               <a:rPr lang="en-US" smtClean="0"/>
-              <a:t>7/8/2023</a:t>
+              <a:t>7/15/2023</a:t>
             </a:fld>
             <a:endParaRPr lang="en-US"/>
           </a:p>
@@ -2356,7 +2359,7 @@
           <a:p>
             <a:fld id="{0BDAA80A-DCF6-416C-B4E9-4897677234EE}" type="datetimeFigureOut">
               <a:rPr lang="en-US" smtClean="0"/>
-              <a:t>7/8/2023</a:t>
+              <a:t>7/15/2023</a:t>
             </a:fld>
             <a:endParaRPr lang="en-US"/>
           </a:p>
@@ -2497,7 +2500,7 @@
           <a:p>
             <a:fld id="{0BDAA80A-DCF6-416C-B4E9-4897677234EE}" type="datetimeFigureOut">
               <a:rPr lang="en-US" smtClean="0"/>
-              <a:t>7/8/2023</a:t>
+              <a:t>7/15/2023</a:t>
             </a:fld>
             <a:endParaRPr lang="en-US"/>
           </a:p>
@@ -2610,7 +2613,7 @@
           <a:p>
             <a:fld id="{0BDAA80A-DCF6-416C-B4E9-4897677234EE}" type="datetimeFigureOut">
               <a:rPr lang="en-US" smtClean="0"/>
-              <a:t>7/8/2023</a:t>
+              <a:t>7/15/2023</a:t>
             </a:fld>
             <a:endParaRPr lang="en-US"/>
           </a:p>
@@ -2921,7 +2924,7 @@
           <a:p>
             <a:fld id="{0BDAA80A-DCF6-416C-B4E9-4897677234EE}" type="datetimeFigureOut">
               <a:rPr lang="en-US" smtClean="0"/>
-              <a:t>7/8/2023</a:t>
+              <a:t>7/15/2023</a:t>
             </a:fld>
             <a:endParaRPr lang="en-US"/>
           </a:p>
@@ -3209,7 +3212,7 @@
           <a:p>
             <a:fld id="{0BDAA80A-DCF6-416C-B4E9-4897677234EE}" type="datetimeFigureOut">
               <a:rPr lang="en-US" smtClean="0"/>
-              <a:t>7/8/2023</a:t>
+              <a:t>7/15/2023</a:t>
             </a:fld>
             <a:endParaRPr lang="en-US"/>
           </a:p>
@@ -3450,7 +3453,7 @@
           <a:p>
             <a:fld id="{0BDAA80A-DCF6-416C-B4E9-4897677234EE}" type="datetimeFigureOut">
               <a:rPr lang="en-US" smtClean="0"/>
-              <a:t>7/8/2023</a:t>
+              <a:t>7/15/2023</a:t>
             </a:fld>
             <a:endParaRPr lang="en-US"/>
           </a:p>
@@ -4146,6 +4149,156 @@
                   </a:schemeClr>
                 </a:solidFill>
               </a:rPr>
+              <a:t> Test Project: Repository</a:t>
+            </a:r>
+            <a:endParaRPr lang="en-US" dirty="0"/>
+          </a:p>
+        </p:txBody>
+      </p:sp>
+      <p:sp>
+        <p:nvSpPr>
+          <p:cNvPr id="3" name="Content Placeholder 2">
+            <a:extLst>
+              <a:ext uri="{FF2B5EF4-FFF2-40B4-BE49-F238E27FC236}">
+                <a16:creationId xmlns:a16="http://schemas.microsoft.com/office/drawing/2014/main" id="{5797EFC7-13C0-4FC0-A007-0F680CE910CC}"/>
+              </a:ext>
+            </a:extLst>
+          </p:cNvPr>
+          <p:cNvSpPr>
+            <a:spLocks noGrp="1"/>
+          </p:cNvSpPr>
+          <p:nvPr>
+            <p:ph idx="1"/>
+          </p:nvPr>
+        </p:nvSpPr>
+        <p:spPr/>
+        <p:txBody>
+          <a:bodyPr/>
+          <a:lstStyle/>
+          <a:p>
+            <a:r>
+              <a:rPr lang="en-US" dirty="0">
+                <a:solidFill>
+                  <a:schemeClr val="accent5">
+                    <a:lumMod val="50000"/>
+                  </a:schemeClr>
+                </a:solidFill>
+              </a:rPr>
+              <a:t>Implement your “fake” class</a:t>
+            </a:r>
+            <a:endParaRPr lang="en-US" dirty="0"/>
+          </a:p>
+          <a:p>
+            <a:pPr lvl="1"/>
+            <a:endParaRPr lang="en-US" dirty="0">
+              <a:solidFill>
+                <a:schemeClr val="accent5">
+                  <a:lumMod val="50000"/>
+                </a:schemeClr>
+              </a:solidFill>
+            </a:endParaRPr>
+          </a:p>
+        </p:txBody>
+      </p:sp>
+      <p:pic>
+        <p:nvPicPr>
+          <p:cNvPr id="5" name="Picture 4">
+            <a:extLst>
+              <a:ext uri="{FF2B5EF4-FFF2-40B4-BE49-F238E27FC236}">
+                <a16:creationId xmlns:a16="http://schemas.microsoft.com/office/drawing/2014/main" id="{FFD61671-2107-4E99-A113-B08FEC66C109}"/>
+              </a:ext>
+            </a:extLst>
+          </p:cNvPr>
+          <p:cNvPicPr>
+            <a:picLocks noChangeAspect="1"/>
+          </p:cNvPicPr>
+          <p:nvPr/>
+        </p:nvPicPr>
+        <p:blipFill>
+          <a:blip r:embed="rId2"/>
+          <a:stretch>
+            <a:fillRect/>
+          </a:stretch>
+        </p:blipFill>
+        <p:spPr>
+          <a:xfrm>
+            <a:off x="4831492" y="2424498"/>
+            <a:ext cx="7154562" cy="4248021"/>
+          </a:xfrm>
+          <a:prstGeom prst="rect">
+            <a:avLst/>
+          </a:prstGeom>
+        </p:spPr>
+      </p:pic>
+    </p:spTree>
+    <p:extLst>
+      <p:ext uri="{BB962C8B-B14F-4D97-AF65-F5344CB8AC3E}">
+        <p14:creationId xmlns:p14="http://schemas.microsoft.com/office/powerpoint/2010/main" val="3417664389"/>
+      </p:ext>
+    </p:extLst>
+  </p:cSld>
+  <p:clrMapOvr>
+    <a:masterClrMapping/>
+  </p:clrMapOvr>
+</p:sld>
+</file>
+
+<file path=ppt/slides/slide11.xml><?xml version="1.0" encoding="utf-8"?>
+<p:sld xmlns:a="http://schemas.openxmlformats.org/drawingml/2006/main" xmlns:r="http://schemas.openxmlformats.org/officeDocument/2006/relationships" xmlns:p="http://schemas.openxmlformats.org/presentationml/2006/main">
+  <p:cSld>
+    <p:spTree>
+      <p:nvGrpSpPr>
+        <p:cNvPr id="1" name=""/>
+        <p:cNvGrpSpPr/>
+        <p:nvPr/>
+      </p:nvGrpSpPr>
+      <p:grpSpPr>
+        <a:xfrm>
+          <a:off x="0" y="0"/>
+          <a:ext cx="0" cy="0"/>
+          <a:chOff x="0" y="0"/>
+          <a:chExt cx="0" cy="0"/>
+        </a:xfrm>
+      </p:grpSpPr>
+      <p:sp>
+        <p:nvSpPr>
+          <p:cNvPr id="2" name="Title 1">
+            <a:extLst>
+              <a:ext uri="{FF2B5EF4-FFF2-40B4-BE49-F238E27FC236}">
+                <a16:creationId xmlns:a16="http://schemas.microsoft.com/office/drawing/2014/main" id="{80BEDA71-1BDB-4194-AF65-CAEDA420A903}"/>
+              </a:ext>
+            </a:extLst>
+          </p:cNvPr>
+          <p:cNvSpPr>
+            <a:spLocks noGrp="1"/>
+          </p:cNvSpPr>
+          <p:nvPr>
+            <p:ph type="title"/>
+          </p:nvPr>
+        </p:nvSpPr>
+        <p:spPr/>
+        <p:txBody>
+          <a:bodyPr/>
+          <a:lstStyle/>
+          <a:p>
+            <a:r>
+              <a:rPr lang="en-US" dirty="0" err="1">
+                <a:solidFill>
+                  <a:schemeClr val="accent5">
+                    <a:lumMod val="50000"/>
+                  </a:schemeClr>
+                </a:solidFill>
+              </a:rPr>
+              <a:t>xUnit</a:t>
+            </a:r>
+            <a:r>
+              <a:rPr lang="en-US" dirty="0">
+                <a:solidFill>
+                  <a:schemeClr val="accent5">
+                    <a:lumMod val="50000"/>
+                  </a:schemeClr>
+                </a:solidFill>
+              </a:rPr>
               <a:t> Test Project: </a:t>
             </a:r>
             <a:r>
@@ -4250,7 +4403,7 @@
 </p:sld>
 </file>
 
-<file path=ppt/slides/slide11.xml><?xml version="1.0" encoding="utf-8"?>
+<file path=ppt/slides/slide12.xml><?xml version="1.0" encoding="utf-8"?>
 <p:sld xmlns:a="http://schemas.openxmlformats.org/drawingml/2006/main" xmlns:r="http://schemas.openxmlformats.org/officeDocument/2006/relationships" xmlns:p="http://schemas.openxmlformats.org/presentationml/2006/main">
   <p:cSld>
     <p:spTree>
@@ -4296,8 +4449,41 @@
                   </a:schemeClr>
                 </a:solidFill>
               </a:rPr>
-              <a:t>InMemoryApi</a:t>
-            </a:r>
+              <a:t>WebApplicationFactory</a:t>
+            </a:r>
+            <a:endParaRPr lang="en-US" dirty="0">
+              <a:solidFill>
+                <a:schemeClr val="accent5">
+                  <a:lumMod val="50000"/>
+                </a:schemeClr>
+              </a:solidFill>
+            </a:endParaRPr>
+          </a:p>
+        </p:txBody>
+      </p:sp>
+      <p:sp>
+        <p:nvSpPr>
+          <p:cNvPr id="3" name="Content Placeholder 2">
+            <a:extLst>
+              <a:ext uri="{FF2B5EF4-FFF2-40B4-BE49-F238E27FC236}">
+                <a16:creationId xmlns:a16="http://schemas.microsoft.com/office/drawing/2014/main" id="{247EFD57-A438-4A13-8DBA-921614D65879}"/>
+              </a:ext>
+            </a:extLst>
+          </p:cNvPr>
+          <p:cNvSpPr>
+            <a:spLocks noGrp="1"/>
+          </p:cNvSpPr>
+          <p:nvPr>
+            <p:ph idx="1"/>
+          </p:nvPr>
+        </p:nvSpPr>
+        <p:spPr/>
+        <p:txBody>
+          <a:bodyPr>
+            <a:normAutofit/>
+          </a:bodyPr>
+          <a:lstStyle/>
+          <a:p>
             <a:r>
               <a:rPr lang="en-US" dirty="0">
                 <a:solidFill>
@@ -4306,7 +4492,454 @@
                   </a:schemeClr>
                 </a:solidFill>
               </a:rPr>
-              <a:t> Custom Class</a:t>
+              <a:t>“Factory for bootstrapping an application in memory for functional end to end tests”</a:t>
+            </a:r>
+          </a:p>
+          <a:p>
+            <a:r>
+              <a:rPr lang="en-US" dirty="0" err="1">
+                <a:solidFill>
+                  <a:schemeClr val="accent5">
+                    <a:lumMod val="50000"/>
+                  </a:schemeClr>
+                </a:solidFill>
+              </a:rPr>
+              <a:t>Microsoft.AspNetCore.Mvc.Testing</a:t>
+            </a:r>
+            <a:endParaRPr lang="en-US" dirty="0">
+              <a:solidFill>
+                <a:schemeClr val="accent5">
+                  <a:lumMod val="50000"/>
+                </a:schemeClr>
+              </a:solidFill>
+            </a:endParaRPr>
+          </a:p>
+          <a:p>
+            <a:r>
+              <a:rPr lang="en-US" dirty="0">
+                <a:solidFill>
+                  <a:schemeClr val="accent5">
+                    <a:lumMod val="50000"/>
+                  </a:schemeClr>
+                </a:solidFill>
+              </a:rPr>
+              <a:t>NOTE: With minimal APIs in .NET 6 we have add code to access the former </a:t>
+            </a:r>
+            <a:r>
+              <a:rPr lang="en-US">
+                <a:solidFill>
+                  <a:schemeClr val="accent5">
+                    <a:lumMod val="50000"/>
+                  </a:schemeClr>
+                </a:solidFill>
+              </a:rPr>
+              <a:t>startup class.</a:t>
+            </a:r>
+            <a:endParaRPr lang="en-US" dirty="0">
+              <a:solidFill>
+                <a:schemeClr val="accent5">
+                  <a:lumMod val="50000"/>
+                </a:schemeClr>
+              </a:solidFill>
+            </a:endParaRPr>
+          </a:p>
+          <a:p>
+            <a:pPr marL="0" indent="0">
+              <a:buNone/>
+            </a:pPr>
+            <a:endParaRPr lang="en-US" dirty="0"/>
+          </a:p>
+          <a:p>
+            <a:endParaRPr lang="en-US" dirty="0">
+              <a:solidFill>
+                <a:schemeClr val="accent5">
+                  <a:lumMod val="50000"/>
+                </a:schemeClr>
+              </a:solidFill>
+            </a:endParaRPr>
+          </a:p>
+        </p:txBody>
+      </p:sp>
+    </p:spTree>
+    <p:extLst>
+      <p:ext uri="{BB962C8B-B14F-4D97-AF65-F5344CB8AC3E}">
+        <p14:creationId xmlns:p14="http://schemas.microsoft.com/office/powerpoint/2010/main" val="2922069679"/>
+      </p:ext>
+    </p:extLst>
+  </p:cSld>
+  <p:clrMapOvr>
+    <a:masterClrMapping/>
+  </p:clrMapOvr>
+</p:sld>
+</file>
+
+<file path=ppt/slides/slide13.xml><?xml version="1.0" encoding="utf-8"?>
+<p:sld xmlns:a="http://schemas.openxmlformats.org/drawingml/2006/main" xmlns:r="http://schemas.openxmlformats.org/officeDocument/2006/relationships" xmlns:p="http://schemas.openxmlformats.org/presentationml/2006/main">
+  <p:cSld>
+    <p:spTree>
+      <p:nvGrpSpPr>
+        <p:cNvPr id="1" name=""/>
+        <p:cNvGrpSpPr/>
+        <p:nvPr/>
+      </p:nvGrpSpPr>
+      <p:grpSpPr>
+        <a:xfrm>
+          <a:off x="0" y="0"/>
+          <a:ext cx="0" cy="0"/>
+          <a:chOff x="0" y="0"/>
+          <a:chExt cx="0" cy="0"/>
+        </a:xfrm>
+      </p:grpSpPr>
+      <p:sp>
+        <p:nvSpPr>
+          <p:cNvPr id="2" name="Title 1">
+            <a:extLst>
+              <a:ext uri="{FF2B5EF4-FFF2-40B4-BE49-F238E27FC236}">
+                <a16:creationId xmlns:a16="http://schemas.microsoft.com/office/drawing/2014/main" id="{80BEDA71-1BDB-4194-AF65-CAEDA420A903}"/>
+              </a:ext>
+            </a:extLst>
+          </p:cNvPr>
+          <p:cNvSpPr>
+            <a:spLocks noGrp="1"/>
+          </p:cNvSpPr>
+          <p:nvPr>
+            <p:ph type="title"/>
+          </p:nvPr>
+        </p:nvSpPr>
+        <p:spPr/>
+        <p:txBody>
+          <a:bodyPr/>
+          <a:lstStyle/>
+          <a:p>
+            <a:r>
+              <a:rPr lang="en-US" dirty="0" err="1">
+                <a:solidFill>
+                  <a:schemeClr val="accent5">
+                    <a:lumMod val="50000"/>
+                  </a:schemeClr>
+                </a:solidFill>
+              </a:rPr>
+              <a:t>WebApplicationFactory</a:t>
+            </a:r>
+            <a:r>
+              <a:rPr lang="en-US" dirty="0">
+                <a:solidFill>
+                  <a:schemeClr val="accent5">
+                    <a:lumMod val="50000"/>
+                  </a:schemeClr>
+                </a:solidFill>
+              </a:rPr>
+              <a:t>: Basic Test</a:t>
+            </a:r>
+            <a:endParaRPr lang="en-US" dirty="0"/>
+          </a:p>
+        </p:txBody>
+      </p:sp>
+      <p:sp>
+        <p:nvSpPr>
+          <p:cNvPr id="3" name="Content Placeholder 2">
+            <a:extLst>
+              <a:ext uri="{FF2B5EF4-FFF2-40B4-BE49-F238E27FC236}">
+                <a16:creationId xmlns:a16="http://schemas.microsoft.com/office/drawing/2014/main" id="{5797EFC7-13C0-4FC0-A007-0F680CE910CC}"/>
+              </a:ext>
+            </a:extLst>
+          </p:cNvPr>
+          <p:cNvSpPr>
+            <a:spLocks noGrp="1"/>
+          </p:cNvSpPr>
+          <p:nvPr>
+            <p:ph idx="1"/>
+          </p:nvPr>
+        </p:nvSpPr>
+        <p:spPr/>
+        <p:txBody>
+          <a:bodyPr/>
+          <a:lstStyle/>
+          <a:p>
+            <a:r>
+              <a:rPr lang="en-US" dirty="0">
+                <a:solidFill>
+                  <a:schemeClr val="accent5">
+                    <a:lumMod val="50000"/>
+                  </a:schemeClr>
+                </a:solidFill>
+              </a:rPr>
+              <a:t>Test with no changes</a:t>
+            </a:r>
+            <a:endParaRPr lang="en-US" dirty="0"/>
+          </a:p>
+          <a:p>
+            <a:pPr lvl="1"/>
+            <a:endParaRPr lang="en-US" dirty="0">
+              <a:solidFill>
+                <a:schemeClr val="accent5">
+                  <a:lumMod val="50000"/>
+                </a:schemeClr>
+              </a:solidFill>
+            </a:endParaRPr>
+          </a:p>
+        </p:txBody>
+      </p:sp>
+      <p:pic>
+        <p:nvPicPr>
+          <p:cNvPr id="6" name="Picture 5">
+            <a:extLst>
+              <a:ext uri="{FF2B5EF4-FFF2-40B4-BE49-F238E27FC236}">
+                <a16:creationId xmlns:a16="http://schemas.microsoft.com/office/drawing/2014/main" id="{38FA2107-4F63-5A99-066E-735AEDD3AB83}"/>
+              </a:ext>
+            </a:extLst>
+          </p:cNvPr>
+          <p:cNvPicPr>
+            <a:picLocks noChangeAspect="1"/>
+          </p:cNvPicPr>
+          <p:nvPr/>
+        </p:nvPicPr>
+        <p:blipFill>
+          <a:blip r:embed="rId2"/>
+          <a:stretch>
+            <a:fillRect/>
+          </a:stretch>
+        </p:blipFill>
+        <p:spPr>
+          <a:xfrm>
+            <a:off x="3534189" y="2656703"/>
+            <a:ext cx="8391626" cy="3836172"/>
+          </a:xfrm>
+          <a:prstGeom prst="rect">
+            <a:avLst/>
+          </a:prstGeom>
+        </p:spPr>
+      </p:pic>
+    </p:spTree>
+    <p:extLst>
+      <p:ext uri="{BB962C8B-B14F-4D97-AF65-F5344CB8AC3E}">
+        <p14:creationId xmlns:p14="http://schemas.microsoft.com/office/powerpoint/2010/main" val="1377008299"/>
+      </p:ext>
+    </p:extLst>
+  </p:cSld>
+  <p:clrMapOvr>
+    <a:masterClrMapping/>
+  </p:clrMapOvr>
+</p:sld>
+</file>
+
+<file path=ppt/slides/slide14.xml><?xml version="1.0" encoding="utf-8"?>
+<p:sld xmlns:a="http://schemas.openxmlformats.org/drawingml/2006/main" xmlns:r="http://schemas.openxmlformats.org/officeDocument/2006/relationships" xmlns:p="http://schemas.openxmlformats.org/presentationml/2006/main">
+  <p:cSld>
+    <p:spTree>
+      <p:nvGrpSpPr>
+        <p:cNvPr id="1" name=""/>
+        <p:cNvGrpSpPr/>
+        <p:nvPr/>
+      </p:nvGrpSpPr>
+      <p:grpSpPr>
+        <a:xfrm>
+          <a:off x="0" y="0"/>
+          <a:ext cx="0" cy="0"/>
+          <a:chOff x="0" y="0"/>
+          <a:chExt cx="0" cy="0"/>
+        </a:xfrm>
+      </p:grpSpPr>
+      <p:sp>
+        <p:nvSpPr>
+          <p:cNvPr id="2" name="Title 1">
+            <a:extLst>
+              <a:ext uri="{FF2B5EF4-FFF2-40B4-BE49-F238E27FC236}">
+                <a16:creationId xmlns:a16="http://schemas.microsoft.com/office/drawing/2014/main" id="{80BEDA71-1BDB-4194-AF65-CAEDA420A903}"/>
+              </a:ext>
+            </a:extLst>
+          </p:cNvPr>
+          <p:cNvSpPr>
+            <a:spLocks noGrp="1"/>
+          </p:cNvSpPr>
+          <p:nvPr>
+            <p:ph type="title"/>
+          </p:nvPr>
+        </p:nvSpPr>
+        <p:spPr/>
+        <p:txBody>
+          <a:bodyPr/>
+          <a:lstStyle/>
+          <a:p>
+            <a:r>
+              <a:rPr lang="en-US" dirty="0" err="1">
+                <a:solidFill>
+                  <a:schemeClr val="accent5">
+                    <a:lumMod val="50000"/>
+                  </a:schemeClr>
+                </a:solidFill>
+              </a:rPr>
+              <a:t>WebApplicationFactory</a:t>
+            </a:r>
+            <a:r>
+              <a:rPr lang="en-US" dirty="0">
+                <a:solidFill>
+                  <a:schemeClr val="accent5">
+                    <a:lumMod val="50000"/>
+                  </a:schemeClr>
+                </a:solidFill>
+              </a:rPr>
+              <a:t>: Override</a:t>
+            </a:r>
+            <a:endParaRPr lang="en-US" dirty="0"/>
+          </a:p>
+        </p:txBody>
+      </p:sp>
+      <p:sp>
+        <p:nvSpPr>
+          <p:cNvPr id="3" name="Content Placeholder 2">
+            <a:extLst>
+              <a:ext uri="{FF2B5EF4-FFF2-40B4-BE49-F238E27FC236}">
+                <a16:creationId xmlns:a16="http://schemas.microsoft.com/office/drawing/2014/main" id="{5797EFC7-13C0-4FC0-A007-0F680CE910CC}"/>
+              </a:ext>
+            </a:extLst>
+          </p:cNvPr>
+          <p:cNvSpPr>
+            <a:spLocks noGrp="1"/>
+          </p:cNvSpPr>
+          <p:nvPr>
+            <p:ph idx="1"/>
+          </p:nvPr>
+        </p:nvSpPr>
+        <p:spPr/>
+        <p:txBody>
+          <a:bodyPr/>
+          <a:lstStyle/>
+          <a:p>
+            <a:r>
+              <a:rPr lang="en-US" dirty="0">
+                <a:solidFill>
+                  <a:schemeClr val="accent5">
+                    <a:lumMod val="50000"/>
+                  </a:schemeClr>
+                </a:solidFill>
+              </a:rPr>
+              <a:t>Override </a:t>
+            </a:r>
+            <a:r>
+              <a:rPr lang="en-US" dirty="0" err="1">
+                <a:solidFill>
+                  <a:schemeClr val="accent5">
+                    <a:lumMod val="50000"/>
+                  </a:schemeClr>
+                </a:solidFill>
+              </a:rPr>
+              <a:t>WebApplicationFactory</a:t>
+            </a:r>
+            <a:endParaRPr lang="en-US" dirty="0"/>
+          </a:p>
+          <a:p>
+            <a:pPr lvl="1"/>
+            <a:endParaRPr lang="en-US" dirty="0">
+              <a:solidFill>
+                <a:schemeClr val="accent5">
+                  <a:lumMod val="50000"/>
+                </a:schemeClr>
+              </a:solidFill>
+            </a:endParaRPr>
+          </a:p>
+        </p:txBody>
+      </p:sp>
+      <p:pic>
+        <p:nvPicPr>
+          <p:cNvPr id="5" name="Picture 4">
+            <a:extLst>
+              <a:ext uri="{FF2B5EF4-FFF2-40B4-BE49-F238E27FC236}">
+                <a16:creationId xmlns:a16="http://schemas.microsoft.com/office/drawing/2014/main" id="{585FC556-D7EE-EE73-1341-617DC8D83F9A}"/>
+              </a:ext>
+            </a:extLst>
+          </p:cNvPr>
+          <p:cNvPicPr>
+            <a:picLocks noChangeAspect="1"/>
+          </p:cNvPicPr>
+          <p:nvPr/>
+        </p:nvPicPr>
+        <p:blipFill>
+          <a:blip r:embed="rId2"/>
+          <a:stretch>
+            <a:fillRect/>
+          </a:stretch>
+        </p:blipFill>
+        <p:spPr>
+          <a:xfrm>
+            <a:off x="4127157" y="2366084"/>
+            <a:ext cx="7811787" cy="4126792"/>
+          </a:xfrm>
+          <a:prstGeom prst="rect">
+            <a:avLst/>
+          </a:prstGeom>
+        </p:spPr>
+      </p:pic>
+    </p:spTree>
+    <p:extLst>
+      <p:ext uri="{BB962C8B-B14F-4D97-AF65-F5344CB8AC3E}">
+        <p14:creationId xmlns:p14="http://schemas.microsoft.com/office/powerpoint/2010/main" val="1366355948"/>
+      </p:ext>
+    </p:extLst>
+  </p:cSld>
+  <p:clrMapOvr>
+    <a:masterClrMapping/>
+  </p:clrMapOvr>
+</p:sld>
+</file>
+
+<file path=ppt/slides/slide15.xml><?xml version="1.0" encoding="utf-8"?>
+<p:sld xmlns:a="http://schemas.openxmlformats.org/drawingml/2006/main" xmlns:r="http://schemas.openxmlformats.org/officeDocument/2006/relationships" xmlns:p="http://schemas.openxmlformats.org/presentationml/2006/main">
+  <p:cSld>
+    <p:spTree>
+      <p:nvGrpSpPr>
+        <p:cNvPr id="1" name=""/>
+        <p:cNvGrpSpPr/>
+        <p:nvPr/>
+      </p:nvGrpSpPr>
+      <p:grpSpPr>
+        <a:xfrm>
+          <a:off x="0" y="0"/>
+          <a:ext cx="0" cy="0"/>
+          <a:chOff x="0" y="0"/>
+          <a:chExt cx="0" cy="0"/>
+        </a:xfrm>
+      </p:grpSpPr>
+      <p:sp>
+        <p:nvSpPr>
+          <p:cNvPr id="2" name="Title 1">
+            <a:extLst>
+              <a:ext uri="{FF2B5EF4-FFF2-40B4-BE49-F238E27FC236}">
+                <a16:creationId xmlns:a16="http://schemas.microsoft.com/office/drawing/2014/main" id="{C5E8972D-19AF-4770-965A-06EA79781A2B}"/>
+              </a:ext>
+            </a:extLst>
+          </p:cNvPr>
+          <p:cNvSpPr>
+            <a:spLocks noGrp="1"/>
+          </p:cNvSpPr>
+          <p:nvPr>
+            <p:ph type="title"/>
+          </p:nvPr>
+        </p:nvSpPr>
+        <p:spPr/>
+        <p:txBody>
+          <a:bodyPr/>
+          <a:lstStyle/>
+          <a:p>
+            <a:r>
+              <a:rPr lang="en-US" dirty="0" err="1">
+                <a:solidFill>
+                  <a:schemeClr val="accent5">
+                    <a:lumMod val="50000"/>
+                  </a:schemeClr>
+                </a:solidFill>
+              </a:rPr>
+              <a:t>WebApplicationFactory</a:t>
+            </a:r>
+            <a:r>
+              <a:rPr lang="en-US" dirty="0">
+                <a:solidFill>
+                  <a:schemeClr val="accent5">
+                    <a:lumMod val="50000"/>
+                  </a:schemeClr>
+                </a:solidFill>
+              </a:rPr>
+              <a:t>: Custom Class</a:t>
             </a:r>
           </a:p>
         </p:txBody>
@@ -4428,7 +5061,7 @@
 </p:sld>
 </file>
 
-<file path=ppt/slides/slide12.xml><?xml version="1.0" encoding="utf-8"?>
+<file path=ppt/slides/slide16.xml><?xml version="1.0" encoding="utf-8"?>
 <p:sld xmlns:a="http://schemas.openxmlformats.org/drawingml/2006/main" xmlns:r="http://schemas.openxmlformats.org/officeDocument/2006/relationships" xmlns:p="http://schemas.openxmlformats.org/presentationml/2006/main">
   <p:cSld>
     <p:spTree>
@@ -4474,6 +5107,310 @@
                   </a:schemeClr>
                 </a:solidFill>
               </a:rPr>
+              <a:t>WebApplicationFactory</a:t>
+            </a:r>
+            <a:r>
+              <a:rPr lang="en-US" dirty="0">
+                <a:solidFill>
+                  <a:schemeClr val="accent5">
+                    <a:lumMod val="50000"/>
+                  </a:schemeClr>
+                </a:solidFill>
+              </a:rPr>
+              <a:t>: Startup</a:t>
+            </a:r>
+          </a:p>
+        </p:txBody>
+      </p:sp>
+      <p:sp>
+        <p:nvSpPr>
+          <p:cNvPr id="3" name="Content Placeholder 2">
+            <a:extLst>
+              <a:ext uri="{FF2B5EF4-FFF2-40B4-BE49-F238E27FC236}">
+                <a16:creationId xmlns:a16="http://schemas.microsoft.com/office/drawing/2014/main" id="{247EFD57-A438-4A13-8DBA-921614D65879}"/>
+              </a:ext>
+            </a:extLst>
+          </p:cNvPr>
+          <p:cNvSpPr>
+            <a:spLocks noGrp="1"/>
+          </p:cNvSpPr>
+          <p:nvPr>
+            <p:ph idx="1"/>
+          </p:nvPr>
+        </p:nvSpPr>
+        <p:spPr/>
+        <p:txBody>
+          <a:bodyPr>
+            <a:normAutofit/>
+          </a:bodyPr>
+          <a:lstStyle/>
+          <a:p>
+            <a:r>
+              <a:rPr lang="en-US" dirty="0">
+                <a:solidFill>
+                  <a:schemeClr val="accent5">
+                    <a:lumMod val="50000"/>
+                  </a:schemeClr>
+                </a:solidFill>
+              </a:rPr>
+              <a:t>Add in anything you need to “setup” for testing</a:t>
+            </a:r>
+          </a:p>
+          <a:p>
+            <a:pPr marL="0" indent="0">
+              <a:buNone/>
+            </a:pPr>
+            <a:endParaRPr lang="en-US" dirty="0"/>
+          </a:p>
+          <a:p>
+            <a:endParaRPr lang="en-US" dirty="0">
+              <a:solidFill>
+                <a:schemeClr val="accent5">
+                  <a:lumMod val="50000"/>
+                </a:schemeClr>
+              </a:solidFill>
+            </a:endParaRPr>
+          </a:p>
+        </p:txBody>
+      </p:sp>
+      <p:pic>
+        <p:nvPicPr>
+          <p:cNvPr id="7" name="Picture 6">
+            <a:extLst>
+              <a:ext uri="{FF2B5EF4-FFF2-40B4-BE49-F238E27FC236}">
+                <a16:creationId xmlns:a16="http://schemas.microsoft.com/office/drawing/2014/main" id="{F23840DC-E0DC-4CA5-8E48-F17E4F0290BB}"/>
+              </a:ext>
+            </a:extLst>
+          </p:cNvPr>
+          <p:cNvPicPr>
+            <a:picLocks noChangeAspect="1"/>
+          </p:cNvPicPr>
+          <p:nvPr/>
+        </p:nvPicPr>
+        <p:blipFill>
+          <a:blip r:embed="rId2"/>
+          <a:stretch>
+            <a:fillRect/>
+          </a:stretch>
+        </p:blipFill>
+        <p:spPr>
+          <a:xfrm>
+            <a:off x="3175686" y="2421732"/>
+            <a:ext cx="8913469" cy="4336899"/>
+          </a:xfrm>
+          <a:prstGeom prst="rect">
+            <a:avLst/>
+          </a:prstGeom>
+        </p:spPr>
+      </p:pic>
+    </p:spTree>
+    <p:extLst>
+      <p:ext uri="{BB962C8B-B14F-4D97-AF65-F5344CB8AC3E}">
+        <p14:creationId xmlns:p14="http://schemas.microsoft.com/office/powerpoint/2010/main" val="3785705103"/>
+      </p:ext>
+    </p:extLst>
+  </p:cSld>
+  <p:clrMapOvr>
+    <a:masterClrMapping/>
+  </p:clrMapOvr>
+</p:sld>
+</file>
+
+<file path=ppt/slides/slide17.xml><?xml version="1.0" encoding="utf-8"?>
+<p:sld xmlns:a="http://schemas.openxmlformats.org/drawingml/2006/main" xmlns:r="http://schemas.openxmlformats.org/officeDocument/2006/relationships" xmlns:p="http://schemas.openxmlformats.org/presentationml/2006/main">
+  <p:cSld>
+    <p:spTree>
+      <p:nvGrpSpPr>
+        <p:cNvPr id="1" name=""/>
+        <p:cNvGrpSpPr/>
+        <p:nvPr/>
+      </p:nvGrpSpPr>
+      <p:grpSpPr>
+        <a:xfrm>
+          <a:off x="0" y="0"/>
+          <a:ext cx="0" cy="0"/>
+          <a:chOff x="0" y="0"/>
+          <a:chExt cx="0" cy="0"/>
+        </a:xfrm>
+      </p:grpSpPr>
+      <p:sp>
+        <p:nvSpPr>
+          <p:cNvPr id="2" name="Title 1">
+            <a:extLst>
+              <a:ext uri="{FF2B5EF4-FFF2-40B4-BE49-F238E27FC236}">
+                <a16:creationId xmlns:a16="http://schemas.microsoft.com/office/drawing/2014/main" id="{C5E8972D-19AF-4770-965A-06EA79781A2B}"/>
+              </a:ext>
+            </a:extLst>
+          </p:cNvPr>
+          <p:cNvSpPr>
+            <a:spLocks noGrp="1"/>
+          </p:cNvSpPr>
+          <p:nvPr>
+            <p:ph type="title"/>
+          </p:nvPr>
+        </p:nvSpPr>
+        <p:spPr/>
+        <p:txBody>
+          <a:bodyPr/>
+          <a:lstStyle/>
+          <a:p>
+            <a:r>
+              <a:rPr lang="en-US" dirty="0" err="1">
+                <a:solidFill>
+                  <a:schemeClr val="accent5">
+                    <a:lumMod val="50000"/>
+                  </a:schemeClr>
+                </a:solidFill>
+              </a:rPr>
+              <a:t>WebApplicationFactory</a:t>
+            </a:r>
+            <a:r>
+              <a:rPr lang="en-US" dirty="0">
+                <a:solidFill>
+                  <a:schemeClr val="accent5">
+                    <a:lumMod val="50000"/>
+                  </a:schemeClr>
+                </a:solidFill>
+              </a:rPr>
+              <a:t>: Authorization</a:t>
+            </a:r>
+          </a:p>
+        </p:txBody>
+      </p:sp>
+      <p:sp>
+        <p:nvSpPr>
+          <p:cNvPr id="3" name="Content Placeholder 2">
+            <a:extLst>
+              <a:ext uri="{FF2B5EF4-FFF2-40B4-BE49-F238E27FC236}">
+                <a16:creationId xmlns:a16="http://schemas.microsoft.com/office/drawing/2014/main" id="{247EFD57-A438-4A13-8DBA-921614D65879}"/>
+              </a:ext>
+            </a:extLst>
+          </p:cNvPr>
+          <p:cNvSpPr>
+            <a:spLocks noGrp="1"/>
+          </p:cNvSpPr>
+          <p:nvPr>
+            <p:ph idx="1"/>
+          </p:nvPr>
+        </p:nvSpPr>
+        <p:spPr/>
+        <p:txBody>
+          <a:bodyPr>
+            <a:normAutofit/>
+          </a:bodyPr>
+          <a:lstStyle/>
+          <a:p>
+            <a:r>
+              <a:rPr lang="en-US" dirty="0">
+                <a:solidFill>
+                  <a:schemeClr val="accent5">
+                    <a:lumMod val="50000"/>
+                  </a:schemeClr>
+                </a:solidFill>
+              </a:rPr>
+              <a:t>Create a custom Authorization client</a:t>
+            </a:r>
+          </a:p>
+          <a:p>
+            <a:endParaRPr lang="en-US" dirty="0">
+              <a:solidFill>
+                <a:schemeClr val="accent5">
+                  <a:lumMod val="50000"/>
+                </a:schemeClr>
+              </a:solidFill>
+            </a:endParaRPr>
+          </a:p>
+        </p:txBody>
+      </p:sp>
+      <p:pic>
+        <p:nvPicPr>
+          <p:cNvPr id="5" name="Picture 4">
+            <a:extLst>
+              <a:ext uri="{FF2B5EF4-FFF2-40B4-BE49-F238E27FC236}">
+                <a16:creationId xmlns:a16="http://schemas.microsoft.com/office/drawing/2014/main" id="{C7189A7E-C81F-42CD-887E-6E74D8651D6A}"/>
+              </a:ext>
+            </a:extLst>
+          </p:cNvPr>
+          <p:cNvPicPr>
+            <a:picLocks noChangeAspect="1"/>
+          </p:cNvPicPr>
+          <p:nvPr/>
+        </p:nvPicPr>
+        <p:blipFill>
+          <a:blip r:embed="rId2"/>
+          <a:stretch>
+            <a:fillRect/>
+          </a:stretch>
+        </p:blipFill>
+        <p:spPr>
+          <a:xfrm>
+            <a:off x="2831885" y="2273386"/>
+            <a:ext cx="9172575" cy="4362450"/>
+          </a:xfrm>
+          <a:prstGeom prst="rect">
+            <a:avLst/>
+          </a:prstGeom>
+        </p:spPr>
+      </p:pic>
+    </p:spTree>
+    <p:extLst>
+      <p:ext uri="{BB962C8B-B14F-4D97-AF65-F5344CB8AC3E}">
+        <p14:creationId xmlns:p14="http://schemas.microsoft.com/office/powerpoint/2010/main" val="1240663459"/>
+      </p:ext>
+    </p:extLst>
+  </p:cSld>
+  <p:clrMapOvr>
+    <a:masterClrMapping/>
+  </p:clrMapOvr>
+</p:sld>
+</file>
+
+<file path=ppt/slides/slide18.xml><?xml version="1.0" encoding="utf-8"?>
+<p:sld xmlns:a="http://schemas.openxmlformats.org/drawingml/2006/main" xmlns:r="http://schemas.openxmlformats.org/officeDocument/2006/relationships" xmlns:p="http://schemas.openxmlformats.org/presentationml/2006/main">
+  <p:cSld>
+    <p:spTree>
+      <p:nvGrpSpPr>
+        <p:cNvPr id="1" name=""/>
+        <p:cNvGrpSpPr/>
+        <p:nvPr/>
+      </p:nvGrpSpPr>
+      <p:grpSpPr>
+        <a:xfrm>
+          <a:off x="0" y="0"/>
+          <a:ext cx="0" cy="0"/>
+          <a:chOff x="0" y="0"/>
+          <a:chExt cx="0" cy="0"/>
+        </a:xfrm>
+      </p:grpSpPr>
+      <p:sp>
+        <p:nvSpPr>
+          <p:cNvPr id="2" name="Title 1">
+            <a:extLst>
+              <a:ext uri="{FF2B5EF4-FFF2-40B4-BE49-F238E27FC236}">
+                <a16:creationId xmlns:a16="http://schemas.microsoft.com/office/drawing/2014/main" id="{C5E8972D-19AF-4770-965A-06EA79781A2B}"/>
+              </a:ext>
+            </a:extLst>
+          </p:cNvPr>
+          <p:cNvSpPr>
+            <a:spLocks noGrp="1"/>
+          </p:cNvSpPr>
+          <p:nvPr>
+            <p:ph type="title"/>
+          </p:nvPr>
+        </p:nvSpPr>
+        <p:spPr/>
+        <p:txBody>
+          <a:bodyPr/>
+          <a:lstStyle/>
+          <a:p>
+            <a:r>
+              <a:rPr lang="en-US" dirty="0" err="1">
+                <a:solidFill>
+                  <a:schemeClr val="accent5">
+                    <a:lumMod val="50000"/>
+                  </a:schemeClr>
+                </a:solidFill>
+              </a:rPr>
               <a:t>IClassFixture</a:t>
             </a:r>
             <a:r>
@@ -4568,7 +5505,7 @@
 </p:sld>
 </file>
 
-<file path=ppt/slides/slide13.xml><?xml version="1.0" encoding="utf-8"?>
+<file path=ppt/slides/slide19.xml><?xml version="1.0" encoding="utf-8"?>
 <p:sld xmlns:a="http://schemas.openxmlformats.org/drawingml/2006/main" xmlns:r="http://schemas.openxmlformats.org/officeDocument/2006/relationships" xmlns:p="http://schemas.openxmlformats.org/presentationml/2006/main">
   <p:cSld>
     <p:spTree>
@@ -4757,1020 +5694,6 @@
 </p:sld>
 </file>
 
-<file path=ppt/slides/slide14.xml><?xml version="1.0" encoding="utf-8"?>
-<p:sld xmlns:a="http://schemas.openxmlformats.org/drawingml/2006/main" xmlns:r="http://schemas.openxmlformats.org/officeDocument/2006/relationships" xmlns:p="http://schemas.openxmlformats.org/presentationml/2006/main">
-  <p:cSld>
-    <p:spTree>
-      <p:nvGrpSpPr>
-        <p:cNvPr id="1" name=""/>
-        <p:cNvGrpSpPr/>
-        <p:nvPr/>
-      </p:nvGrpSpPr>
-      <p:grpSpPr>
-        <a:xfrm>
-          <a:off x="0" y="0"/>
-          <a:ext cx="0" cy="0"/>
-          <a:chOff x="0" y="0"/>
-          <a:chExt cx="0" cy="0"/>
-        </a:xfrm>
-      </p:grpSpPr>
-      <p:sp>
-        <p:nvSpPr>
-          <p:cNvPr id="2" name="Title 1">
-            <a:extLst>
-              <a:ext uri="{FF2B5EF4-FFF2-40B4-BE49-F238E27FC236}">
-                <a16:creationId xmlns:a16="http://schemas.microsoft.com/office/drawing/2014/main" id="{C5E8972D-19AF-4770-965A-06EA79781A2B}"/>
-              </a:ext>
-            </a:extLst>
-          </p:cNvPr>
-          <p:cNvSpPr>
-            <a:spLocks noGrp="1"/>
-          </p:cNvSpPr>
-          <p:nvPr>
-            <p:ph type="title"/>
-          </p:nvPr>
-        </p:nvSpPr>
-        <p:spPr/>
-        <p:txBody>
-          <a:bodyPr/>
-          <a:lstStyle/>
-          <a:p>
-            <a:r>
-              <a:rPr lang="en-US" dirty="0" err="1">
-                <a:solidFill>
-                  <a:schemeClr val="accent5">
-                    <a:lumMod val="50000"/>
-                  </a:schemeClr>
-                </a:solidFill>
-              </a:rPr>
-              <a:t>WebApplicationFactory</a:t>
-            </a:r>
-            <a:endParaRPr lang="en-US" dirty="0">
-              <a:solidFill>
-                <a:schemeClr val="accent5">
-                  <a:lumMod val="50000"/>
-                </a:schemeClr>
-              </a:solidFill>
-            </a:endParaRPr>
-          </a:p>
-        </p:txBody>
-      </p:sp>
-      <p:sp>
-        <p:nvSpPr>
-          <p:cNvPr id="3" name="Content Placeholder 2">
-            <a:extLst>
-              <a:ext uri="{FF2B5EF4-FFF2-40B4-BE49-F238E27FC236}">
-                <a16:creationId xmlns:a16="http://schemas.microsoft.com/office/drawing/2014/main" id="{247EFD57-A438-4A13-8DBA-921614D65879}"/>
-              </a:ext>
-            </a:extLst>
-          </p:cNvPr>
-          <p:cNvSpPr>
-            <a:spLocks noGrp="1"/>
-          </p:cNvSpPr>
-          <p:nvPr>
-            <p:ph idx="1"/>
-          </p:nvPr>
-        </p:nvSpPr>
-        <p:spPr/>
-        <p:txBody>
-          <a:bodyPr>
-            <a:normAutofit/>
-          </a:bodyPr>
-          <a:lstStyle/>
-          <a:p>
-            <a:r>
-              <a:rPr lang="en-US" dirty="0">
-                <a:solidFill>
-                  <a:schemeClr val="accent5">
-                    <a:lumMod val="50000"/>
-                  </a:schemeClr>
-                </a:solidFill>
-              </a:rPr>
-              <a:t>“Factory for bootstrapping an application in memory for functional end to end tests”</a:t>
-            </a:r>
-          </a:p>
-          <a:p>
-            <a:r>
-              <a:rPr lang="en-US" dirty="0" err="1">
-                <a:solidFill>
-                  <a:schemeClr val="accent5">
-                    <a:lumMod val="50000"/>
-                  </a:schemeClr>
-                </a:solidFill>
-              </a:rPr>
-              <a:t>Microsoft.AspNetCore.Mvc.Testing</a:t>
-            </a:r>
-            <a:endParaRPr lang="en-US" dirty="0">
-              <a:solidFill>
-                <a:schemeClr val="accent5">
-                  <a:lumMod val="50000"/>
-                </a:schemeClr>
-              </a:solidFill>
-            </a:endParaRPr>
-          </a:p>
-          <a:p>
-            <a:r>
-              <a:rPr lang="en-US" dirty="0">
-                <a:solidFill>
-                  <a:schemeClr val="accent5">
-                    <a:lumMod val="50000"/>
-                  </a:schemeClr>
-                </a:solidFill>
-              </a:rPr>
-              <a:t>NOTE: With minimal APIs in .NET 6 we have add code to access the former </a:t>
-            </a:r>
-            <a:r>
-              <a:rPr lang="en-US">
-                <a:solidFill>
-                  <a:schemeClr val="accent5">
-                    <a:lumMod val="50000"/>
-                  </a:schemeClr>
-                </a:solidFill>
-              </a:rPr>
-              <a:t>startup class.</a:t>
-            </a:r>
-            <a:endParaRPr lang="en-US" dirty="0">
-              <a:solidFill>
-                <a:schemeClr val="accent5">
-                  <a:lumMod val="50000"/>
-                </a:schemeClr>
-              </a:solidFill>
-            </a:endParaRPr>
-          </a:p>
-          <a:p>
-            <a:pPr marL="0" indent="0">
-              <a:buNone/>
-            </a:pPr>
-            <a:endParaRPr lang="en-US" dirty="0"/>
-          </a:p>
-          <a:p>
-            <a:endParaRPr lang="en-US" dirty="0">
-              <a:solidFill>
-                <a:schemeClr val="accent5">
-                  <a:lumMod val="50000"/>
-                </a:schemeClr>
-              </a:solidFill>
-            </a:endParaRPr>
-          </a:p>
-        </p:txBody>
-      </p:sp>
-    </p:spTree>
-    <p:extLst>
-      <p:ext uri="{BB962C8B-B14F-4D97-AF65-F5344CB8AC3E}">
-        <p14:creationId xmlns:p14="http://schemas.microsoft.com/office/powerpoint/2010/main" val="2922069679"/>
-      </p:ext>
-    </p:extLst>
-  </p:cSld>
-  <p:clrMapOvr>
-    <a:masterClrMapping/>
-  </p:clrMapOvr>
-</p:sld>
-</file>
-
-<file path=ppt/slides/slide15.xml><?xml version="1.0" encoding="utf-8"?>
-<p:sld xmlns:a="http://schemas.openxmlformats.org/drawingml/2006/main" xmlns:r="http://schemas.openxmlformats.org/officeDocument/2006/relationships" xmlns:p="http://schemas.openxmlformats.org/presentationml/2006/main">
-  <p:cSld>
-    <p:spTree>
-      <p:nvGrpSpPr>
-        <p:cNvPr id="1" name=""/>
-        <p:cNvGrpSpPr/>
-        <p:nvPr/>
-      </p:nvGrpSpPr>
-      <p:grpSpPr>
-        <a:xfrm>
-          <a:off x="0" y="0"/>
-          <a:ext cx="0" cy="0"/>
-          <a:chOff x="0" y="0"/>
-          <a:chExt cx="0" cy="0"/>
-        </a:xfrm>
-      </p:grpSpPr>
-      <p:sp>
-        <p:nvSpPr>
-          <p:cNvPr id="2" name="Title 1">
-            <a:extLst>
-              <a:ext uri="{FF2B5EF4-FFF2-40B4-BE49-F238E27FC236}">
-                <a16:creationId xmlns:a16="http://schemas.microsoft.com/office/drawing/2014/main" id="{C5E8972D-19AF-4770-965A-06EA79781A2B}"/>
-              </a:ext>
-            </a:extLst>
-          </p:cNvPr>
-          <p:cNvSpPr>
-            <a:spLocks noGrp="1"/>
-          </p:cNvSpPr>
-          <p:nvPr>
-            <p:ph type="title"/>
-          </p:nvPr>
-        </p:nvSpPr>
-        <p:spPr/>
-        <p:txBody>
-          <a:bodyPr/>
-          <a:lstStyle/>
-          <a:p>
-            <a:r>
-              <a:rPr lang="en-US" dirty="0" err="1">
-                <a:solidFill>
-                  <a:schemeClr val="accent5">
-                    <a:lumMod val="50000"/>
-                  </a:schemeClr>
-                </a:solidFill>
-              </a:rPr>
-              <a:t>WebApplicationFactory</a:t>
-            </a:r>
-            <a:r>
-              <a:rPr lang="en-US" dirty="0">
-                <a:solidFill>
-                  <a:schemeClr val="accent5">
-                    <a:lumMod val="50000"/>
-                  </a:schemeClr>
-                </a:solidFill>
-              </a:rPr>
-              <a:t>: Startup</a:t>
-            </a:r>
-          </a:p>
-        </p:txBody>
-      </p:sp>
-      <p:sp>
-        <p:nvSpPr>
-          <p:cNvPr id="3" name="Content Placeholder 2">
-            <a:extLst>
-              <a:ext uri="{FF2B5EF4-FFF2-40B4-BE49-F238E27FC236}">
-                <a16:creationId xmlns:a16="http://schemas.microsoft.com/office/drawing/2014/main" id="{247EFD57-A438-4A13-8DBA-921614D65879}"/>
-              </a:ext>
-            </a:extLst>
-          </p:cNvPr>
-          <p:cNvSpPr>
-            <a:spLocks noGrp="1"/>
-          </p:cNvSpPr>
-          <p:nvPr>
-            <p:ph idx="1"/>
-          </p:nvPr>
-        </p:nvSpPr>
-        <p:spPr/>
-        <p:txBody>
-          <a:bodyPr>
-            <a:normAutofit/>
-          </a:bodyPr>
-          <a:lstStyle/>
-          <a:p>
-            <a:r>
-              <a:rPr lang="en-US" dirty="0">
-                <a:solidFill>
-                  <a:schemeClr val="accent5">
-                    <a:lumMod val="50000"/>
-                  </a:schemeClr>
-                </a:solidFill>
-              </a:rPr>
-              <a:t>Add in anything you need to “setup” for testing</a:t>
-            </a:r>
-          </a:p>
-          <a:p>
-            <a:pPr marL="0" indent="0">
-              <a:buNone/>
-            </a:pPr>
-            <a:endParaRPr lang="en-US" dirty="0"/>
-          </a:p>
-          <a:p>
-            <a:endParaRPr lang="en-US" dirty="0">
-              <a:solidFill>
-                <a:schemeClr val="accent5">
-                  <a:lumMod val="50000"/>
-                </a:schemeClr>
-              </a:solidFill>
-            </a:endParaRPr>
-          </a:p>
-        </p:txBody>
-      </p:sp>
-      <p:pic>
-        <p:nvPicPr>
-          <p:cNvPr id="7" name="Picture 6">
-            <a:extLst>
-              <a:ext uri="{FF2B5EF4-FFF2-40B4-BE49-F238E27FC236}">
-                <a16:creationId xmlns:a16="http://schemas.microsoft.com/office/drawing/2014/main" id="{F23840DC-E0DC-4CA5-8E48-F17E4F0290BB}"/>
-              </a:ext>
-            </a:extLst>
-          </p:cNvPr>
-          <p:cNvPicPr>
-            <a:picLocks noChangeAspect="1"/>
-          </p:cNvPicPr>
-          <p:nvPr/>
-        </p:nvPicPr>
-        <p:blipFill>
-          <a:blip r:embed="rId2"/>
-          <a:stretch>
-            <a:fillRect/>
-          </a:stretch>
-        </p:blipFill>
-        <p:spPr>
-          <a:xfrm>
-            <a:off x="3175686" y="2421732"/>
-            <a:ext cx="8913469" cy="4336899"/>
-          </a:xfrm>
-          <a:prstGeom prst="rect">
-            <a:avLst/>
-          </a:prstGeom>
-        </p:spPr>
-      </p:pic>
-    </p:spTree>
-    <p:extLst>
-      <p:ext uri="{BB962C8B-B14F-4D97-AF65-F5344CB8AC3E}">
-        <p14:creationId xmlns:p14="http://schemas.microsoft.com/office/powerpoint/2010/main" val="3785705103"/>
-      </p:ext>
-    </p:extLst>
-  </p:cSld>
-  <p:clrMapOvr>
-    <a:masterClrMapping/>
-  </p:clrMapOvr>
-</p:sld>
-</file>
-
-<file path=ppt/slides/slide16.xml><?xml version="1.0" encoding="utf-8"?>
-<p:sld xmlns:a="http://schemas.openxmlformats.org/drawingml/2006/main" xmlns:r="http://schemas.openxmlformats.org/officeDocument/2006/relationships" xmlns:p="http://schemas.openxmlformats.org/presentationml/2006/main">
-  <p:cSld>
-    <p:spTree>
-      <p:nvGrpSpPr>
-        <p:cNvPr id="1" name=""/>
-        <p:cNvGrpSpPr/>
-        <p:nvPr/>
-      </p:nvGrpSpPr>
-      <p:grpSpPr>
-        <a:xfrm>
-          <a:off x="0" y="0"/>
-          <a:ext cx="0" cy="0"/>
-          <a:chOff x="0" y="0"/>
-          <a:chExt cx="0" cy="0"/>
-        </a:xfrm>
-      </p:grpSpPr>
-      <p:sp>
-        <p:nvSpPr>
-          <p:cNvPr id="2" name="Title 1">
-            <a:extLst>
-              <a:ext uri="{FF2B5EF4-FFF2-40B4-BE49-F238E27FC236}">
-                <a16:creationId xmlns:a16="http://schemas.microsoft.com/office/drawing/2014/main" id="{C5E8972D-19AF-4770-965A-06EA79781A2B}"/>
-              </a:ext>
-            </a:extLst>
-          </p:cNvPr>
-          <p:cNvSpPr>
-            <a:spLocks noGrp="1"/>
-          </p:cNvSpPr>
-          <p:nvPr>
-            <p:ph type="title"/>
-          </p:nvPr>
-        </p:nvSpPr>
-        <p:spPr/>
-        <p:txBody>
-          <a:bodyPr/>
-          <a:lstStyle/>
-          <a:p>
-            <a:r>
-              <a:rPr lang="en-US" dirty="0" err="1">
-                <a:solidFill>
-                  <a:schemeClr val="accent5">
-                    <a:lumMod val="50000"/>
-                  </a:schemeClr>
-                </a:solidFill>
-              </a:rPr>
-              <a:t>WebApplicationFactory</a:t>
-            </a:r>
-            <a:r>
-              <a:rPr lang="en-US" dirty="0">
-                <a:solidFill>
-                  <a:schemeClr val="accent5">
-                    <a:lumMod val="50000"/>
-                  </a:schemeClr>
-                </a:solidFill>
-              </a:rPr>
-              <a:t>: Authorization</a:t>
-            </a:r>
-          </a:p>
-        </p:txBody>
-      </p:sp>
-      <p:sp>
-        <p:nvSpPr>
-          <p:cNvPr id="3" name="Content Placeholder 2">
-            <a:extLst>
-              <a:ext uri="{FF2B5EF4-FFF2-40B4-BE49-F238E27FC236}">
-                <a16:creationId xmlns:a16="http://schemas.microsoft.com/office/drawing/2014/main" id="{247EFD57-A438-4A13-8DBA-921614D65879}"/>
-              </a:ext>
-            </a:extLst>
-          </p:cNvPr>
-          <p:cNvSpPr>
-            <a:spLocks noGrp="1"/>
-          </p:cNvSpPr>
-          <p:nvPr>
-            <p:ph idx="1"/>
-          </p:nvPr>
-        </p:nvSpPr>
-        <p:spPr/>
-        <p:txBody>
-          <a:bodyPr>
-            <a:normAutofit/>
-          </a:bodyPr>
-          <a:lstStyle/>
-          <a:p>
-            <a:r>
-              <a:rPr lang="en-US" dirty="0">
-                <a:solidFill>
-                  <a:schemeClr val="accent5">
-                    <a:lumMod val="50000"/>
-                  </a:schemeClr>
-                </a:solidFill>
-              </a:rPr>
-              <a:t>Create a custom Authorization client</a:t>
-            </a:r>
-          </a:p>
-          <a:p>
-            <a:endParaRPr lang="en-US" dirty="0">
-              <a:solidFill>
-                <a:schemeClr val="accent5">
-                  <a:lumMod val="50000"/>
-                </a:schemeClr>
-              </a:solidFill>
-            </a:endParaRPr>
-          </a:p>
-        </p:txBody>
-      </p:sp>
-      <p:pic>
-        <p:nvPicPr>
-          <p:cNvPr id="5" name="Picture 4">
-            <a:extLst>
-              <a:ext uri="{FF2B5EF4-FFF2-40B4-BE49-F238E27FC236}">
-                <a16:creationId xmlns:a16="http://schemas.microsoft.com/office/drawing/2014/main" id="{C7189A7E-C81F-42CD-887E-6E74D8651D6A}"/>
-              </a:ext>
-            </a:extLst>
-          </p:cNvPr>
-          <p:cNvPicPr>
-            <a:picLocks noChangeAspect="1"/>
-          </p:cNvPicPr>
-          <p:nvPr/>
-        </p:nvPicPr>
-        <p:blipFill>
-          <a:blip r:embed="rId2"/>
-          <a:stretch>
-            <a:fillRect/>
-          </a:stretch>
-        </p:blipFill>
-        <p:spPr>
-          <a:xfrm>
-            <a:off x="2831885" y="2273386"/>
-            <a:ext cx="9172575" cy="4362450"/>
-          </a:xfrm>
-          <a:prstGeom prst="rect">
-            <a:avLst/>
-          </a:prstGeom>
-        </p:spPr>
-      </p:pic>
-    </p:spTree>
-    <p:extLst>
-      <p:ext uri="{BB962C8B-B14F-4D97-AF65-F5344CB8AC3E}">
-        <p14:creationId xmlns:p14="http://schemas.microsoft.com/office/powerpoint/2010/main" val="1240663459"/>
-      </p:ext>
-    </p:extLst>
-  </p:cSld>
-  <p:clrMapOvr>
-    <a:masterClrMapping/>
-  </p:clrMapOvr>
-</p:sld>
-</file>
-
-<file path=ppt/slides/slide17.xml><?xml version="1.0" encoding="utf-8"?>
-<p:sld xmlns:a="http://schemas.openxmlformats.org/drawingml/2006/main" xmlns:r="http://schemas.openxmlformats.org/officeDocument/2006/relationships" xmlns:p="http://schemas.openxmlformats.org/presentationml/2006/main">
-  <p:cSld>
-    <p:spTree>
-      <p:nvGrpSpPr>
-        <p:cNvPr id="1" name=""/>
-        <p:cNvGrpSpPr/>
-        <p:nvPr/>
-      </p:nvGrpSpPr>
-      <p:grpSpPr>
-        <a:xfrm>
-          <a:off x="0" y="0"/>
-          <a:ext cx="0" cy="0"/>
-          <a:chOff x="0" y="0"/>
-          <a:chExt cx="0" cy="0"/>
-        </a:xfrm>
-      </p:grpSpPr>
-      <p:sp>
-        <p:nvSpPr>
-          <p:cNvPr id="2" name="Title 1">
-            <a:extLst>
-              <a:ext uri="{FF2B5EF4-FFF2-40B4-BE49-F238E27FC236}">
-                <a16:creationId xmlns:a16="http://schemas.microsoft.com/office/drawing/2014/main" id="{C5E8972D-19AF-4770-965A-06EA79781A2B}"/>
-              </a:ext>
-            </a:extLst>
-          </p:cNvPr>
-          <p:cNvSpPr>
-            <a:spLocks noGrp="1"/>
-          </p:cNvSpPr>
-          <p:nvPr>
-            <p:ph type="title"/>
-          </p:nvPr>
-        </p:nvSpPr>
-        <p:spPr/>
-        <p:txBody>
-          <a:bodyPr/>
-          <a:lstStyle/>
-          <a:p>
-            <a:r>
-              <a:rPr lang="en-US" dirty="0">
-                <a:solidFill>
-                  <a:schemeClr val="accent5">
-                    <a:lumMod val="50000"/>
-                  </a:schemeClr>
-                </a:solidFill>
-              </a:rPr>
-              <a:t>Conclusion</a:t>
-            </a:r>
-          </a:p>
-        </p:txBody>
-      </p:sp>
-      <p:sp>
-        <p:nvSpPr>
-          <p:cNvPr id="3" name="Content Placeholder 2">
-            <a:extLst>
-              <a:ext uri="{FF2B5EF4-FFF2-40B4-BE49-F238E27FC236}">
-                <a16:creationId xmlns:a16="http://schemas.microsoft.com/office/drawing/2014/main" id="{247EFD57-A438-4A13-8DBA-921614D65879}"/>
-              </a:ext>
-            </a:extLst>
-          </p:cNvPr>
-          <p:cNvSpPr>
-            <a:spLocks noGrp="1"/>
-          </p:cNvSpPr>
-          <p:nvPr>
-            <p:ph idx="1"/>
-          </p:nvPr>
-        </p:nvSpPr>
-        <p:spPr/>
-        <p:txBody>
-          <a:bodyPr>
-            <a:normAutofit/>
-          </a:bodyPr>
-          <a:lstStyle/>
-          <a:p>
-            <a:r>
-              <a:rPr lang="en-US" dirty="0">
-                <a:solidFill>
-                  <a:schemeClr val="accent5">
-                    <a:lumMod val="50000"/>
-                  </a:schemeClr>
-                </a:solidFill>
-              </a:rPr>
-              <a:t>Simple-</a:t>
-            </a:r>
-            <a:r>
-              <a:rPr lang="en-US" dirty="0" err="1">
-                <a:solidFill>
-                  <a:schemeClr val="accent5">
-                    <a:lumMod val="50000"/>
-                  </a:schemeClr>
-                </a:solidFill>
-              </a:rPr>
-              <a:t>ish</a:t>
-            </a:r>
-            <a:endParaRPr lang="en-US" dirty="0">
-              <a:solidFill>
-                <a:schemeClr val="accent5">
-                  <a:lumMod val="50000"/>
-                </a:schemeClr>
-              </a:solidFill>
-            </a:endParaRPr>
-          </a:p>
-          <a:p>
-            <a:r>
-              <a:rPr lang="en-US" dirty="0">
-                <a:solidFill>
-                  <a:schemeClr val="accent5">
-                    <a:lumMod val="50000"/>
-                  </a:schemeClr>
-                </a:solidFill>
-              </a:rPr>
-              <a:t>Enables end to end testing in Visual Studio</a:t>
-            </a:r>
-          </a:p>
-          <a:p>
-            <a:pPr lvl="1"/>
-            <a:r>
-              <a:rPr lang="en-US" dirty="0">
-                <a:solidFill>
-                  <a:schemeClr val="accent5">
-                    <a:lumMod val="50000"/>
-                  </a:schemeClr>
-                </a:solidFill>
-              </a:rPr>
-              <a:t>Allows debugging</a:t>
-            </a:r>
-          </a:p>
-          <a:p>
-            <a:pPr lvl="1"/>
-            <a:r>
-              <a:rPr lang="en-US" dirty="0">
-                <a:solidFill>
-                  <a:schemeClr val="accent5">
-                    <a:lumMod val="50000"/>
-                  </a:schemeClr>
-                </a:solidFill>
-              </a:rPr>
-              <a:t>Don’t have to start VS and then run your test software</a:t>
-            </a:r>
-          </a:p>
-          <a:p>
-            <a:endParaRPr lang="en-US" dirty="0">
-              <a:solidFill>
-                <a:schemeClr val="accent5">
-                  <a:lumMod val="50000"/>
-                </a:schemeClr>
-              </a:solidFill>
-            </a:endParaRPr>
-          </a:p>
-        </p:txBody>
-      </p:sp>
-    </p:spTree>
-    <p:extLst>
-      <p:ext uri="{BB962C8B-B14F-4D97-AF65-F5344CB8AC3E}">
-        <p14:creationId xmlns:p14="http://schemas.microsoft.com/office/powerpoint/2010/main" val="2148422421"/>
-      </p:ext>
-    </p:extLst>
-  </p:cSld>
-  <p:clrMapOvr>
-    <a:masterClrMapping/>
-  </p:clrMapOvr>
-</p:sld>
-</file>
-
-<file path=ppt/slides/slide18.xml><?xml version="1.0" encoding="utf-8"?>
-<p:sld xmlns:a="http://schemas.openxmlformats.org/drawingml/2006/main" xmlns:r="http://schemas.openxmlformats.org/officeDocument/2006/relationships" xmlns:p="http://schemas.openxmlformats.org/presentationml/2006/main">
-  <p:cSld>
-    <p:spTree>
-      <p:nvGrpSpPr>
-        <p:cNvPr id="1" name=""/>
-        <p:cNvGrpSpPr/>
-        <p:nvPr/>
-      </p:nvGrpSpPr>
-      <p:grpSpPr>
-        <a:xfrm>
-          <a:off x="0" y="0"/>
-          <a:ext cx="0" cy="0"/>
-          <a:chOff x="0" y="0"/>
-          <a:chExt cx="0" cy="0"/>
-        </a:xfrm>
-      </p:grpSpPr>
-      <p:sp>
-        <p:nvSpPr>
-          <p:cNvPr id="2" name="Title 1">
-            <a:extLst>
-              <a:ext uri="{FF2B5EF4-FFF2-40B4-BE49-F238E27FC236}">
-                <a16:creationId xmlns:a16="http://schemas.microsoft.com/office/drawing/2014/main" id="{8E184895-4B3D-4D82-9AF9-B36996CDB0D5}"/>
-              </a:ext>
-            </a:extLst>
-          </p:cNvPr>
-          <p:cNvSpPr>
-            <a:spLocks noGrp="1"/>
-          </p:cNvSpPr>
-          <p:nvPr>
-            <p:ph type="title"/>
-          </p:nvPr>
-        </p:nvSpPr>
-        <p:spPr/>
-        <p:txBody>
-          <a:bodyPr/>
-          <a:lstStyle/>
-          <a:p>
-            <a:r>
-              <a:rPr lang="en-US" dirty="0">
-                <a:solidFill>
-                  <a:srgbClr val="1F4E79"/>
-                </a:solidFill>
-              </a:rPr>
-              <a:t>Links</a:t>
-            </a:r>
-          </a:p>
-        </p:txBody>
-      </p:sp>
-      <p:sp>
-        <p:nvSpPr>
-          <p:cNvPr id="3" name="Content Placeholder 2">
-            <a:extLst>
-              <a:ext uri="{FF2B5EF4-FFF2-40B4-BE49-F238E27FC236}">
-                <a16:creationId xmlns:a16="http://schemas.microsoft.com/office/drawing/2014/main" id="{15C7FCC2-13FA-46CE-A8A6-BD77D14C2A8F}"/>
-              </a:ext>
-            </a:extLst>
-          </p:cNvPr>
-          <p:cNvSpPr>
-            <a:spLocks noGrp="1"/>
-          </p:cNvSpPr>
-          <p:nvPr>
-            <p:ph idx="1"/>
-          </p:nvPr>
-        </p:nvSpPr>
-        <p:spPr/>
-        <p:txBody>
-          <a:bodyPr>
-            <a:normAutofit/>
-          </a:bodyPr>
-          <a:lstStyle/>
-          <a:p>
-            <a:r>
-              <a:rPr lang="en-US" dirty="0" err="1">
-                <a:solidFill>
-                  <a:srgbClr val="1F4E79"/>
-                </a:solidFill>
-              </a:rPr>
-              <a:t>WebApplicationFactory</a:t>
-            </a:r>
-            <a:r>
-              <a:rPr lang="en-US" dirty="0">
-                <a:solidFill>
-                  <a:srgbClr val="1F4E79"/>
-                </a:solidFill>
-              </a:rPr>
-              <a:t>: </a:t>
-            </a:r>
-            <a:r>
-              <a:rPr lang="en-US" dirty="0">
-                <a:solidFill>
-                  <a:srgbClr val="1F4E79"/>
-                </a:solidFill>
-                <a:hlinkClick r:id="rId2"/>
-              </a:rPr>
-              <a:t>https://docs.microsoft.com/en-us/dotnet/api/microsoft.aspnetcore.mvc.testing.webapplicationfactory-1?view=aspnetcore-5.0</a:t>
-            </a:r>
-            <a:endParaRPr lang="en-US" dirty="0">
-              <a:solidFill>
-                <a:srgbClr val="1F4E79"/>
-              </a:solidFill>
-            </a:endParaRPr>
-          </a:p>
-          <a:p>
-            <a:r>
-              <a:rPr lang="en-US" dirty="0" err="1">
-                <a:solidFill>
-                  <a:srgbClr val="1F4E79"/>
-                </a:solidFill>
-              </a:rPr>
-              <a:t>IClassFixture</a:t>
-            </a:r>
-            <a:r>
-              <a:rPr lang="en-US" dirty="0">
-                <a:solidFill>
-                  <a:srgbClr val="1F4E79"/>
-                </a:solidFill>
-              </a:rPr>
-              <a:t>: </a:t>
-            </a:r>
-            <a:r>
-              <a:rPr lang="en-US" dirty="0">
-                <a:solidFill>
-                  <a:srgbClr val="1F4E79"/>
-                </a:solidFill>
-                <a:hlinkClick r:id="rId3"/>
-              </a:rPr>
-              <a:t>https://xunit.net/docs/shared-context</a:t>
-            </a:r>
-            <a:endParaRPr lang="en-US" dirty="0">
-              <a:solidFill>
-                <a:srgbClr val="1F4E79"/>
-              </a:solidFill>
-            </a:endParaRPr>
-          </a:p>
-          <a:p>
-            <a:r>
-              <a:rPr lang="en-US" dirty="0">
-                <a:solidFill>
-                  <a:srgbClr val="1F4E79"/>
-                </a:solidFill>
-              </a:rPr>
-              <a:t>Code Repository: </a:t>
-            </a:r>
-            <a:r>
-              <a:rPr lang="en-US" dirty="0">
-                <a:solidFill>
-                  <a:srgbClr val="1F4E79"/>
-                </a:solidFill>
-                <a:hlinkClick r:id="rId4"/>
-              </a:rPr>
-              <a:t>https://github.com/ehennis/Blog/tree/master/WebApplicationFactory/NCode</a:t>
-            </a:r>
-            <a:endParaRPr lang="en-US" dirty="0">
-              <a:solidFill>
-                <a:srgbClr val="1F4E79"/>
-              </a:solidFill>
-            </a:endParaRPr>
-          </a:p>
-          <a:p>
-            <a:endParaRPr lang="en-US" dirty="0">
-              <a:solidFill>
-                <a:srgbClr val="1F4E79"/>
-              </a:solidFill>
-            </a:endParaRPr>
-          </a:p>
-          <a:p>
-            <a:endParaRPr lang="en-US" dirty="0"/>
-          </a:p>
-          <a:p>
-            <a:endParaRPr lang="en-US" dirty="0"/>
-          </a:p>
-        </p:txBody>
-      </p:sp>
-    </p:spTree>
-    <p:extLst>
-      <p:ext uri="{BB962C8B-B14F-4D97-AF65-F5344CB8AC3E}">
-        <p14:creationId xmlns:p14="http://schemas.microsoft.com/office/powerpoint/2010/main" val="4150764362"/>
-      </p:ext>
-    </p:extLst>
-  </p:cSld>
-  <p:clrMapOvr>
-    <a:masterClrMapping/>
-  </p:clrMapOvr>
-</p:sld>
-</file>
-
-<file path=ppt/slides/slide19.xml><?xml version="1.0" encoding="utf-8"?>
-<p:sld xmlns:a="http://schemas.openxmlformats.org/drawingml/2006/main" xmlns:r="http://schemas.openxmlformats.org/officeDocument/2006/relationships" xmlns:p="http://schemas.openxmlformats.org/presentationml/2006/main">
-  <p:cSld>
-    <p:spTree>
-      <p:nvGrpSpPr>
-        <p:cNvPr id="1" name=""/>
-        <p:cNvGrpSpPr/>
-        <p:nvPr/>
-      </p:nvGrpSpPr>
-      <p:grpSpPr>
-        <a:xfrm>
-          <a:off x="0" y="0"/>
-          <a:ext cx="0" cy="0"/>
-          <a:chOff x="0" y="0"/>
-          <a:chExt cx="0" cy="0"/>
-        </a:xfrm>
-      </p:grpSpPr>
-      <p:sp>
-        <p:nvSpPr>
-          <p:cNvPr id="2" name="Title 1">
-            <a:extLst>
-              <a:ext uri="{FF2B5EF4-FFF2-40B4-BE49-F238E27FC236}">
-                <a16:creationId xmlns:a16="http://schemas.microsoft.com/office/drawing/2014/main" id="{8E184895-4B3D-4D82-9AF9-B36996CDB0D5}"/>
-              </a:ext>
-            </a:extLst>
-          </p:cNvPr>
-          <p:cNvSpPr>
-            <a:spLocks noGrp="1"/>
-          </p:cNvSpPr>
-          <p:nvPr>
-            <p:ph type="title"/>
-          </p:nvPr>
-        </p:nvSpPr>
-        <p:spPr/>
-        <p:txBody>
-          <a:bodyPr/>
-          <a:lstStyle/>
-          <a:p>
-            <a:r>
-              <a:rPr lang="en-US" dirty="0">
-                <a:solidFill>
-                  <a:srgbClr val="1F4E79"/>
-                </a:solidFill>
-              </a:rPr>
-              <a:t>My Information</a:t>
-            </a:r>
-          </a:p>
-        </p:txBody>
-      </p:sp>
-      <p:sp>
-        <p:nvSpPr>
-          <p:cNvPr id="3" name="Content Placeholder 2">
-            <a:extLst>
-              <a:ext uri="{FF2B5EF4-FFF2-40B4-BE49-F238E27FC236}">
-                <a16:creationId xmlns:a16="http://schemas.microsoft.com/office/drawing/2014/main" id="{15C7FCC2-13FA-46CE-A8A6-BD77D14C2A8F}"/>
-              </a:ext>
-            </a:extLst>
-          </p:cNvPr>
-          <p:cNvSpPr>
-            <a:spLocks noGrp="1"/>
-          </p:cNvSpPr>
-          <p:nvPr>
-            <p:ph idx="1"/>
-          </p:nvPr>
-        </p:nvSpPr>
-        <p:spPr/>
-        <p:txBody>
-          <a:bodyPr/>
-          <a:lstStyle/>
-          <a:p>
-            <a:r>
-              <a:rPr lang="en-US" dirty="0">
-                <a:solidFill>
-                  <a:srgbClr val="1F4E79"/>
-                </a:solidFill>
-              </a:rPr>
-              <a:t>Twitter: @</a:t>
-            </a:r>
-            <a:r>
-              <a:rPr lang="en-US" dirty="0" err="1">
-                <a:solidFill>
-                  <a:srgbClr val="1F4E79"/>
-                </a:solidFill>
-              </a:rPr>
-              <a:t>TheNurl</a:t>
-            </a:r>
-            <a:endParaRPr lang="en-US" dirty="0">
-              <a:solidFill>
-                <a:srgbClr val="1F4E79"/>
-              </a:solidFill>
-            </a:endParaRPr>
-          </a:p>
-          <a:p>
-            <a:r>
-              <a:rPr lang="en-US" dirty="0">
-                <a:solidFill>
-                  <a:srgbClr val="1F4E79"/>
-                </a:solidFill>
-              </a:rPr>
-              <a:t>GitHub: </a:t>
-            </a:r>
-            <a:r>
-              <a:rPr lang="en-US" dirty="0">
-                <a:solidFill>
-                  <a:srgbClr val="1F4E79"/>
-                </a:solidFill>
-                <a:hlinkClick r:id="rId2"/>
-              </a:rPr>
-              <a:t>https://github.com/ehennis</a:t>
-            </a:r>
-            <a:endParaRPr lang="en-US" dirty="0">
-              <a:solidFill>
-                <a:srgbClr val="1F4E79"/>
-              </a:solidFill>
-            </a:endParaRPr>
-          </a:p>
-          <a:p>
-            <a:r>
-              <a:rPr lang="en-US" dirty="0">
-                <a:solidFill>
-                  <a:srgbClr val="1F4E79"/>
-                </a:solidFill>
-              </a:rPr>
-              <a:t>YouTube: Evan Hennis</a:t>
-            </a:r>
-          </a:p>
-          <a:p>
-            <a:r>
-              <a:rPr lang="en-US" dirty="0">
-                <a:solidFill>
-                  <a:srgbClr val="1F4E79"/>
-                </a:solidFill>
-              </a:rPr>
-              <a:t>Blog: </a:t>
-            </a:r>
-            <a:r>
-              <a:rPr lang="en-US" dirty="0">
-                <a:solidFill>
-                  <a:srgbClr val="1F4E79"/>
-                </a:solidFill>
-                <a:hlinkClick r:id="rId3"/>
-              </a:rPr>
-              <a:t>http://blog.eckronsoftware.com</a:t>
-            </a:r>
-            <a:endParaRPr lang="en-US" dirty="0">
-              <a:solidFill>
-                <a:srgbClr val="1F4E79"/>
-              </a:solidFill>
-            </a:endParaRPr>
-          </a:p>
-          <a:p>
-            <a:r>
-              <a:rPr lang="en-US" dirty="0">
-                <a:solidFill>
-                  <a:srgbClr val="1F4E79"/>
-                </a:solidFill>
-              </a:rPr>
-              <a:t>Email: </a:t>
-            </a:r>
-            <a:r>
-              <a:rPr lang="en-US" dirty="0">
-                <a:solidFill>
-                  <a:srgbClr val="1F4E79"/>
-                </a:solidFill>
-                <a:hlinkClick r:id="rId4"/>
-              </a:rPr>
-              <a:t>EvanHennis@gmail.com</a:t>
-            </a:r>
-            <a:endParaRPr lang="en-US" dirty="0">
-              <a:solidFill>
-                <a:srgbClr val="1F4E79"/>
-              </a:solidFill>
-            </a:endParaRPr>
-          </a:p>
-        </p:txBody>
-      </p:sp>
-    </p:spTree>
-    <p:extLst>
-      <p:ext uri="{BB962C8B-B14F-4D97-AF65-F5344CB8AC3E}">
-        <p14:creationId xmlns:p14="http://schemas.microsoft.com/office/powerpoint/2010/main" val="3640291696"/>
-      </p:ext>
-    </p:extLst>
-  </p:cSld>
-  <p:clrMapOvr>
-    <a:masterClrMapping/>
-  </p:clrMapOvr>
-</p:sld>
-</file>
-
 <file path=ppt/slides/slide2.xml><?xml version="1.0" encoding="utf-8"?>
 <p:sld xmlns:a="http://schemas.openxmlformats.org/drawingml/2006/main" xmlns:r="http://schemas.openxmlformats.org/officeDocument/2006/relationships" xmlns:p="http://schemas.openxmlformats.org/presentationml/2006/main">
   <p:cSld>
@@ -6010,6 +5933,546 @@
     <p:extLst>
       <p:ext uri="{BB962C8B-B14F-4D97-AF65-F5344CB8AC3E}">
         <p14:creationId xmlns:p14="http://schemas.microsoft.com/office/powerpoint/2010/main" val="1739772145"/>
+      </p:ext>
+    </p:extLst>
+  </p:cSld>
+  <p:clrMapOvr>
+    <a:masterClrMapping/>
+  </p:clrMapOvr>
+</p:sld>
+</file>
+
+<file path=ppt/slides/slide20.xml><?xml version="1.0" encoding="utf-8"?>
+<p:sld xmlns:a="http://schemas.openxmlformats.org/drawingml/2006/main" xmlns:r="http://schemas.openxmlformats.org/officeDocument/2006/relationships" xmlns:p="http://schemas.openxmlformats.org/presentationml/2006/main">
+  <p:cSld>
+    <p:spTree>
+      <p:nvGrpSpPr>
+        <p:cNvPr id="1" name=""/>
+        <p:cNvGrpSpPr/>
+        <p:nvPr/>
+      </p:nvGrpSpPr>
+      <p:grpSpPr>
+        <a:xfrm>
+          <a:off x="0" y="0"/>
+          <a:ext cx="0" cy="0"/>
+          <a:chOff x="0" y="0"/>
+          <a:chExt cx="0" cy="0"/>
+        </a:xfrm>
+      </p:grpSpPr>
+      <p:sp>
+        <p:nvSpPr>
+          <p:cNvPr id="2" name="Title 1">
+            <a:extLst>
+              <a:ext uri="{FF2B5EF4-FFF2-40B4-BE49-F238E27FC236}">
+                <a16:creationId xmlns:a16="http://schemas.microsoft.com/office/drawing/2014/main" id="{C5E8972D-19AF-4770-965A-06EA79781A2B}"/>
+              </a:ext>
+            </a:extLst>
+          </p:cNvPr>
+          <p:cNvSpPr>
+            <a:spLocks noGrp="1"/>
+          </p:cNvSpPr>
+          <p:nvPr>
+            <p:ph type="title"/>
+          </p:nvPr>
+        </p:nvSpPr>
+        <p:spPr/>
+        <p:txBody>
+          <a:bodyPr/>
+          <a:lstStyle/>
+          <a:p>
+            <a:r>
+              <a:rPr lang="en-US" dirty="0">
+                <a:solidFill>
+                  <a:schemeClr val="accent5">
+                    <a:lumMod val="50000"/>
+                  </a:schemeClr>
+                </a:solidFill>
+              </a:rPr>
+              <a:t>Conclusion</a:t>
+            </a:r>
+          </a:p>
+        </p:txBody>
+      </p:sp>
+      <p:sp>
+        <p:nvSpPr>
+          <p:cNvPr id="3" name="Content Placeholder 2">
+            <a:extLst>
+              <a:ext uri="{FF2B5EF4-FFF2-40B4-BE49-F238E27FC236}">
+                <a16:creationId xmlns:a16="http://schemas.microsoft.com/office/drawing/2014/main" id="{247EFD57-A438-4A13-8DBA-921614D65879}"/>
+              </a:ext>
+            </a:extLst>
+          </p:cNvPr>
+          <p:cNvSpPr>
+            <a:spLocks noGrp="1"/>
+          </p:cNvSpPr>
+          <p:nvPr>
+            <p:ph idx="1"/>
+          </p:nvPr>
+        </p:nvSpPr>
+        <p:spPr/>
+        <p:txBody>
+          <a:bodyPr>
+            <a:normAutofit/>
+          </a:bodyPr>
+          <a:lstStyle/>
+          <a:p>
+            <a:r>
+              <a:rPr lang="en-US" dirty="0">
+                <a:solidFill>
+                  <a:schemeClr val="accent5">
+                    <a:lumMod val="50000"/>
+                  </a:schemeClr>
+                </a:solidFill>
+              </a:rPr>
+              <a:t>Simple-</a:t>
+            </a:r>
+            <a:r>
+              <a:rPr lang="en-US" dirty="0" err="1">
+                <a:solidFill>
+                  <a:schemeClr val="accent5">
+                    <a:lumMod val="50000"/>
+                  </a:schemeClr>
+                </a:solidFill>
+              </a:rPr>
+              <a:t>ish</a:t>
+            </a:r>
+            <a:endParaRPr lang="en-US" dirty="0">
+              <a:solidFill>
+                <a:schemeClr val="accent5">
+                  <a:lumMod val="50000"/>
+                </a:schemeClr>
+              </a:solidFill>
+            </a:endParaRPr>
+          </a:p>
+          <a:p>
+            <a:r>
+              <a:rPr lang="en-US" dirty="0">
+                <a:solidFill>
+                  <a:schemeClr val="accent5">
+                    <a:lumMod val="50000"/>
+                  </a:schemeClr>
+                </a:solidFill>
+              </a:rPr>
+              <a:t>Enables end to end testing in Visual Studio</a:t>
+            </a:r>
+          </a:p>
+          <a:p>
+            <a:pPr lvl="1"/>
+            <a:r>
+              <a:rPr lang="en-US" dirty="0">
+                <a:solidFill>
+                  <a:schemeClr val="accent5">
+                    <a:lumMod val="50000"/>
+                  </a:schemeClr>
+                </a:solidFill>
+              </a:rPr>
+              <a:t>Allows debugging</a:t>
+            </a:r>
+          </a:p>
+          <a:p>
+            <a:pPr lvl="1"/>
+            <a:r>
+              <a:rPr lang="en-US" dirty="0">
+                <a:solidFill>
+                  <a:schemeClr val="accent5">
+                    <a:lumMod val="50000"/>
+                  </a:schemeClr>
+                </a:solidFill>
+              </a:rPr>
+              <a:t>Don’t have to start VS and then run your test software</a:t>
+            </a:r>
+          </a:p>
+          <a:p>
+            <a:endParaRPr lang="en-US" dirty="0">
+              <a:solidFill>
+                <a:schemeClr val="accent5">
+                  <a:lumMod val="50000"/>
+                </a:schemeClr>
+              </a:solidFill>
+            </a:endParaRPr>
+          </a:p>
+        </p:txBody>
+      </p:sp>
+    </p:spTree>
+    <p:extLst>
+      <p:ext uri="{BB962C8B-B14F-4D97-AF65-F5344CB8AC3E}">
+        <p14:creationId xmlns:p14="http://schemas.microsoft.com/office/powerpoint/2010/main" val="2148422421"/>
+      </p:ext>
+    </p:extLst>
+  </p:cSld>
+  <p:clrMapOvr>
+    <a:masterClrMapping/>
+  </p:clrMapOvr>
+</p:sld>
+</file>
+
+<file path=ppt/slides/slide21.xml><?xml version="1.0" encoding="utf-8"?>
+<p:sld xmlns:a="http://schemas.openxmlformats.org/drawingml/2006/main" xmlns:r="http://schemas.openxmlformats.org/officeDocument/2006/relationships" xmlns:p="http://schemas.openxmlformats.org/presentationml/2006/main">
+  <p:cSld>
+    <p:spTree>
+      <p:nvGrpSpPr>
+        <p:cNvPr id="1" name=""/>
+        <p:cNvGrpSpPr/>
+        <p:nvPr/>
+      </p:nvGrpSpPr>
+      <p:grpSpPr>
+        <a:xfrm>
+          <a:off x="0" y="0"/>
+          <a:ext cx="0" cy="0"/>
+          <a:chOff x="0" y="0"/>
+          <a:chExt cx="0" cy="0"/>
+        </a:xfrm>
+      </p:grpSpPr>
+      <p:sp>
+        <p:nvSpPr>
+          <p:cNvPr id="2" name="Title 1">
+            <a:extLst>
+              <a:ext uri="{FF2B5EF4-FFF2-40B4-BE49-F238E27FC236}">
+                <a16:creationId xmlns:a16="http://schemas.microsoft.com/office/drawing/2014/main" id="{8E184895-4B3D-4D82-9AF9-B36996CDB0D5}"/>
+              </a:ext>
+            </a:extLst>
+          </p:cNvPr>
+          <p:cNvSpPr>
+            <a:spLocks noGrp="1"/>
+          </p:cNvSpPr>
+          <p:nvPr>
+            <p:ph type="title"/>
+          </p:nvPr>
+        </p:nvSpPr>
+        <p:spPr/>
+        <p:txBody>
+          <a:bodyPr/>
+          <a:lstStyle/>
+          <a:p>
+            <a:r>
+              <a:rPr lang="en-US" dirty="0">
+                <a:solidFill>
+                  <a:srgbClr val="1F4E79"/>
+                </a:solidFill>
+              </a:rPr>
+              <a:t>Links</a:t>
+            </a:r>
+          </a:p>
+        </p:txBody>
+      </p:sp>
+      <p:sp>
+        <p:nvSpPr>
+          <p:cNvPr id="3" name="Content Placeholder 2">
+            <a:extLst>
+              <a:ext uri="{FF2B5EF4-FFF2-40B4-BE49-F238E27FC236}">
+                <a16:creationId xmlns:a16="http://schemas.microsoft.com/office/drawing/2014/main" id="{15C7FCC2-13FA-46CE-A8A6-BD77D14C2A8F}"/>
+              </a:ext>
+            </a:extLst>
+          </p:cNvPr>
+          <p:cNvSpPr>
+            <a:spLocks noGrp="1"/>
+          </p:cNvSpPr>
+          <p:nvPr>
+            <p:ph idx="1"/>
+          </p:nvPr>
+        </p:nvSpPr>
+        <p:spPr/>
+        <p:txBody>
+          <a:bodyPr>
+            <a:normAutofit/>
+          </a:bodyPr>
+          <a:lstStyle/>
+          <a:p>
+            <a:r>
+              <a:rPr lang="en-US" dirty="0" err="1">
+                <a:solidFill>
+                  <a:srgbClr val="1F4E79"/>
+                </a:solidFill>
+              </a:rPr>
+              <a:t>WebApplicationFactory</a:t>
+            </a:r>
+            <a:r>
+              <a:rPr lang="en-US" dirty="0">
+                <a:solidFill>
+                  <a:srgbClr val="1F4E79"/>
+                </a:solidFill>
+              </a:rPr>
+              <a:t>: </a:t>
+            </a:r>
+            <a:r>
+              <a:rPr lang="en-US" dirty="0">
+                <a:solidFill>
+                  <a:srgbClr val="1F4E79"/>
+                </a:solidFill>
+                <a:hlinkClick r:id="rId2"/>
+              </a:rPr>
+              <a:t>https://docs.microsoft.com/en-us/dotnet/api/microsoft.aspnetcore.mvc.testing.webapplicationfactory-1?view=aspnetcore-5.0</a:t>
+            </a:r>
+            <a:endParaRPr lang="en-US" dirty="0">
+              <a:solidFill>
+                <a:srgbClr val="1F4E79"/>
+              </a:solidFill>
+            </a:endParaRPr>
+          </a:p>
+          <a:p>
+            <a:r>
+              <a:rPr lang="en-US" dirty="0" err="1">
+                <a:solidFill>
+                  <a:srgbClr val="1F4E79"/>
+                </a:solidFill>
+              </a:rPr>
+              <a:t>IClassFixture</a:t>
+            </a:r>
+            <a:r>
+              <a:rPr lang="en-US" dirty="0">
+                <a:solidFill>
+                  <a:srgbClr val="1F4E79"/>
+                </a:solidFill>
+              </a:rPr>
+              <a:t>: </a:t>
+            </a:r>
+            <a:r>
+              <a:rPr lang="en-US" dirty="0">
+                <a:solidFill>
+                  <a:srgbClr val="1F4E79"/>
+                </a:solidFill>
+                <a:hlinkClick r:id="rId3"/>
+              </a:rPr>
+              <a:t>https://xunit.net/docs/shared-context</a:t>
+            </a:r>
+            <a:endParaRPr lang="en-US" dirty="0">
+              <a:solidFill>
+                <a:srgbClr val="1F4E79"/>
+              </a:solidFill>
+            </a:endParaRPr>
+          </a:p>
+          <a:p>
+            <a:r>
+              <a:rPr lang="en-US" dirty="0">
+                <a:solidFill>
+                  <a:srgbClr val="1F4E79"/>
+                </a:solidFill>
+              </a:rPr>
+              <a:t>Code Repository: </a:t>
+            </a:r>
+            <a:r>
+              <a:rPr lang="en-US" dirty="0">
+                <a:solidFill>
+                  <a:srgbClr val="1F4E79"/>
+                </a:solidFill>
+                <a:hlinkClick r:id="rId4"/>
+              </a:rPr>
+              <a:t>https://github.com/ehennis/Blog/tree/master/WebApplicationFactory/NCode</a:t>
+            </a:r>
+            <a:endParaRPr lang="en-US" dirty="0">
+              <a:solidFill>
+                <a:srgbClr val="1F4E79"/>
+              </a:solidFill>
+            </a:endParaRPr>
+          </a:p>
+          <a:p>
+            <a:endParaRPr lang="en-US" dirty="0">
+              <a:solidFill>
+                <a:srgbClr val="1F4E79"/>
+              </a:solidFill>
+            </a:endParaRPr>
+          </a:p>
+          <a:p>
+            <a:endParaRPr lang="en-US" dirty="0"/>
+          </a:p>
+          <a:p>
+            <a:endParaRPr lang="en-US" dirty="0"/>
+          </a:p>
+        </p:txBody>
+      </p:sp>
+    </p:spTree>
+    <p:extLst>
+      <p:ext uri="{BB962C8B-B14F-4D97-AF65-F5344CB8AC3E}">
+        <p14:creationId xmlns:p14="http://schemas.microsoft.com/office/powerpoint/2010/main" val="4150764362"/>
+      </p:ext>
+    </p:extLst>
+  </p:cSld>
+  <p:clrMapOvr>
+    <a:masterClrMapping/>
+  </p:clrMapOvr>
+</p:sld>
+</file>
+
+<file path=ppt/slides/slide22.xml><?xml version="1.0" encoding="utf-8"?>
+<p:sld xmlns:a="http://schemas.openxmlformats.org/drawingml/2006/main" xmlns:r="http://schemas.openxmlformats.org/officeDocument/2006/relationships" xmlns:p="http://schemas.openxmlformats.org/presentationml/2006/main">
+  <p:cSld>
+    <p:spTree>
+      <p:nvGrpSpPr>
+        <p:cNvPr id="1" name=""/>
+        <p:cNvGrpSpPr/>
+        <p:nvPr/>
+      </p:nvGrpSpPr>
+      <p:grpSpPr>
+        <a:xfrm>
+          <a:off x="0" y="0"/>
+          <a:ext cx="0" cy="0"/>
+          <a:chOff x="0" y="0"/>
+          <a:chExt cx="0" cy="0"/>
+        </a:xfrm>
+      </p:grpSpPr>
+      <p:sp>
+        <p:nvSpPr>
+          <p:cNvPr id="2" name="Title 1">
+            <a:extLst>
+              <a:ext uri="{FF2B5EF4-FFF2-40B4-BE49-F238E27FC236}">
+                <a16:creationId xmlns:a16="http://schemas.microsoft.com/office/drawing/2014/main" id="{8E184895-4B3D-4D82-9AF9-B36996CDB0D5}"/>
+              </a:ext>
+            </a:extLst>
+          </p:cNvPr>
+          <p:cNvSpPr>
+            <a:spLocks noGrp="1"/>
+          </p:cNvSpPr>
+          <p:nvPr>
+            <p:ph type="title"/>
+          </p:nvPr>
+        </p:nvSpPr>
+        <p:spPr/>
+        <p:txBody>
+          <a:bodyPr/>
+          <a:lstStyle/>
+          <a:p>
+            <a:r>
+              <a:rPr lang="en-US" dirty="0">
+                <a:solidFill>
+                  <a:srgbClr val="1F4E79"/>
+                </a:solidFill>
+              </a:rPr>
+              <a:t>My Information</a:t>
+            </a:r>
+          </a:p>
+        </p:txBody>
+      </p:sp>
+      <p:sp>
+        <p:nvSpPr>
+          <p:cNvPr id="3" name="Content Placeholder 2">
+            <a:extLst>
+              <a:ext uri="{FF2B5EF4-FFF2-40B4-BE49-F238E27FC236}">
+                <a16:creationId xmlns:a16="http://schemas.microsoft.com/office/drawing/2014/main" id="{15C7FCC2-13FA-46CE-A8A6-BD77D14C2A8F}"/>
+              </a:ext>
+            </a:extLst>
+          </p:cNvPr>
+          <p:cNvSpPr>
+            <a:spLocks noGrp="1"/>
+          </p:cNvSpPr>
+          <p:nvPr>
+            <p:ph idx="1"/>
+          </p:nvPr>
+        </p:nvSpPr>
+        <p:spPr/>
+        <p:txBody>
+          <a:bodyPr/>
+          <a:lstStyle/>
+          <a:p>
+            <a:r>
+              <a:rPr lang="en-US" dirty="0">
+                <a:solidFill>
+                  <a:srgbClr val="1F4E79"/>
+                </a:solidFill>
+              </a:rPr>
+              <a:t>Twitter: @</a:t>
+            </a:r>
+            <a:r>
+              <a:rPr lang="en-US" dirty="0" err="1">
+                <a:solidFill>
+                  <a:srgbClr val="1F4E79"/>
+                </a:solidFill>
+              </a:rPr>
+              <a:t>TheNurl</a:t>
+            </a:r>
+            <a:endParaRPr lang="en-US" dirty="0">
+              <a:solidFill>
+                <a:srgbClr val="1F4E79"/>
+              </a:solidFill>
+            </a:endParaRPr>
+          </a:p>
+          <a:p>
+            <a:r>
+              <a:rPr lang="en-US" dirty="0">
+                <a:solidFill>
+                  <a:srgbClr val="1F4E79"/>
+                </a:solidFill>
+              </a:rPr>
+              <a:t>GitHub: </a:t>
+            </a:r>
+            <a:r>
+              <a:rPr lang="en-US" dirty="0">
+                <a:solidFill>
+                  <a:srgbClr val="1F4E79"/>
+                </a:solidFill>
+                <a:hlinkClick r:id="rId2"/>
+              </a:rPr>
+              <a:t>https://github.com/ehennis</a:t>
+            </a:r>
+            <a:endParaRPr lang="en-US" dirty="0">
+              <a:solidFill>
+                <a:srgbClr val="1F4E79"/>
+              </a:solidFill>
+            </a:endParaRPr>
+          </a:p>
+          <a:p>
+            <a:r>
+              <a:rPr lang="en-US" dirty="0">
+                <a:solidFill>
+                  <a:srgbClr val="1F4E79"/>
+                </a:solidFill>
+              </a:rPr>
+              <a:t>YouTube: Evan Hennis</a:t>
+            </a:r>
+          </a:p>
+          <a:p>
+            <a:r>
+              <a:rPr lang="en-US" dirty="0">
+                <a:solidFill>
+                  <a:srgbClr val="1F4E79"/>
+                </a:solidFill>
+              </a:rPr>
+              <a:t>Blog: </a:t>
+            </a:r>
+            <a:r>
+              <a:rPr lang="en-US" dirty="0">
+                <a:solidFill>
+                  <a:srgbClr val="1F4E79"/>
+                </a:solidFill>
+                <a:hlinkClick r:id="rId3"/>
+              </a:rPr>
+              <a:t>http://blog.eckronsoftware.com</a:t>
+            </a:r>
+            <a:endParaRPr lang="en-US" dirty="0">
+              <a:solidFill>
+                <a:srgbClr val="1F4E79"/>
+              </a:solidFill>
+            </a:endParaRPr>
+          </a:p>
+          <a:p>
+            <a:r>
+              <a:rPr lang="en-US" dirty="0">
+                <a:solidFill>
+                  <a:srgbClr val="1F4E79"/>
+                </a:solidFill>
+              </a:rPr>
+              <a:t>Email: </a:t>
+            </a:r>
+            <a:r>
+              <a:rPr lang="en-US" dirty="0">
+                <a:solidFill>
+                  <a:srgbClr val="1F4E79"/>
+                </a:solidFill>
+                <a:hlinkClick r:id="rId4"/>
+              </a:rPr>
+              <a:t>EvanHennis@gmail.com</a:t>
+            </a:r>
+            <a:endParaRPr lang="en-US" dirty="0">
+              <a:solidFill>
+                <a:srgbClr val="1F4E79"/>
+              </a:solidFill>
+            </a:endParaRPr>
+          </a:p>
+        </p:txBody>
+      </p:sp>
+    </p:spTree>
+    <p:extLst>
+      <p:ext uri="{BB962C8B-B14F-4D97-AF65-F5344CB8AC3E}">
+        <p14:creationId xmlns:p14="http://schemas.microsoft.com/office/powerpoint/2010/main" val="3640291696"/>
       </p:ext>
     </p:extLst>
   </p:cSld>
@@ -6672,7 +7135,7 @@
                   </a:schemeClr>
                 </a:solidFill>
               </a:rPr>
-              <a:t>.NET Framework 6</a:t>
+              <a:t>.NET Framework 7</a:t>
             </a:r>
           </a:p>
           <a:p>
@@ -7037,7 +7500,7 @@
                   </a:schemeClr>
                 </a:solidFill>
               </a:rPr>
-              <a:t>.NET 6</a:t>
+              <a:t>.NET 7</a:t>
             </a:r>
           </a:p>
           <a:p>
@@ -7143,6 +7606,51 @@
           <a:lstStyle/>
           <a:p>
             <a:r>
+              <a:rPr lang="en-US" dirty="0">
+                <a:solidFill>
+                  <a:schemeClr val="accent5">
+                    <a:lumMod val="50000"/>
+                  </a:schemeClr>
+                </a:solidFill>
+              </a:rPr>
+              <a:t>&gt;= .NET 6.0 Change</a:t>
+            </a:r>
+            <a:endParaRPr lang="en-US" dirty="0"/>
+          </a:p>
+        </p:txBody>
+      </p:sp>
+      <p:sp>
+        <p:nvSpPr>
+          <p:cNvPr id="3" name="Content Placeholder 2">
+            <a:extLst>
+              <a:ext uri="{FF2B5EF4-FFF2-40B4-BE49-F238E27FC236}">
+                <a16:creationId xmlns:a16="http://schemas.microsoft.com/office/drawing/2014/main" id="{5797EFC7-13C0-4FC0-A007-0F680CE910CC}"/>
+              </a:ext>
+            </a:extLst>
+          </p:cNvPr>
+          <p:cNvSpPr>
+            <a:spLocks noGrp="1"/>
+          </p:cNvSpPr>
+          <p:nvPr>
+            <p:ph idx="1"/>
+          </p:nvPr>
+        </p:nvSpPr>
+        <p:spPr/>
+        <p:txBody>
+          <a:bodyPr/>
+          <a:lstStyle/>
+          <a:p>
+            <a:r>
+              <a:rPr lang="en-US" dirty="0">
+                <a:solidFill>
+                  <a:schemeClr val="accent5">
+                    <a:lumMod val="50000"/>
+                  </a:schemeClr>
+                </a:solidFill>
+              </a:rPr>
+              <a:t>Startup and Program =&gt; </a:t>
+            </a:r>
+            <a:r>
               <a:rPr lang="en-US" dirty="0" err="1">
                 <a:solidFill>
                   <a:schemeClr val="accent5">
@@ -7150,8 +7658,17 @@
                   </a:schemeClr>
                 </a:solidFill>
               </a:rPr>
-              <a:t>xUnit</a:t>
-            </a:r>
+              <a:t>Program.cs</a:t>
+            </a:r>
+            <a:endParaRPr lang="en-US" dirty="0">
+              <a:solidFill>
+                <a:schemeClr val="accent5">
+                  <a:lumMod val="50000"/>
+                </a:schemeClr>
+              </a:solidFill>
+            </a:endParaRPr>
+          </a:p>
+          <a:p>
             <a:r>
               <a:rPr lang="en-US" dirty="0">
                 <a:solidFill>
@@ -7160,32 +7677,9 @@
                   </a:schemeClr>
                 </a:solidFill>
               </a:rPr>
-              <a:t> Test Project: Repository</a:t>
-            </a:r>
-            <a:endParaRPr lang="en-US" dirty="0"/>
-          </a:p>
-        </p:txBody>
-      </p:sp>
-      <p:sp>
-        <p:nvSpPr>
-          <p:cNvPr id="3" name="Content Placeholder 2">
-            <a:extLst>
-              <a:ext uri="{FF2B5EF4-FFF2-40B4-BE49-F238E27FC236}">
-                <a16:creationId xmlns:a16="http://schemas.microsoft.com/office/drawing/2014/main" id="{5797EFC7-13C0-4FC0-A007-0F680CE910CC}"/>
-              </a:ext>
-            </a:extLst>
-          </p:cNvPr>
-          <p:cNvSpPr>
-            <a:spLocks noGrp="1"/>
-          </p:cNvSpPr>
-          <p:nvPr>
-            <p:ph idx="1"/>
-          </p:nvPr>
-        </p:nvSpPr>
-        <p:spPr/>
-        <p:txBody>
-          <a:bodyPr/>
-          <a:lstStyle/>
+              <a:t>No longer have a Program Class</a:t>
+            </a:r>
+          </a:p>
           <a:p>
             <a:r>
               <a:rPr lang="en-US" dirty="0">
@@ -7194,8 +7688,9 @@
                     <a:lumMod val="50000"/>
                   </a:schemeClr>
                 </a:solidFill>
-              </a:rPr>
-              <a:t>Implement your “fake” class</a:t>
+                <a:hlinkClick r:id="rId2"/>
+              </a:rPr>
+              <a:t>Link</a:t>
             </a:r>
             <a:endParaRPr lang="en-US" dirty="0"/>
           </a:p>
@@ -7216,7 +7711,7 @@
           <p:cNvPr id="5" name="Picture 4">
             <a:extLst>
               <a:ext uri="{FF2B5EF4-FFF2-40B4-BE49-F238E27FC236}">
-                <a16:creationId xmlns:a16="http://schemas.microsoft.com/office/drawing/2014/main" id="{FFD61671-2107-4E99-A113-B08FEC66C109}"/>
+                <a16:creationId xmlns:a16="http://schemas.microsoft.com/office/drawing/2014/main" id="{EF0FC9D3-A700-67B7-C638-38883757DCA2}"/>
               </a:ext>
             </a:extLst>
           </p:cNvPr>
@@ -7226,15 +7721,15 @@
           <p:nvPr/>
         </p:nvPicPr>
         <p:blipFill>
-          <a:blip r:embed="rId2"/>
+          <a:blip r:embed="rId3"/>
           <a:stretch>
             <a:fillRect/>
           </a:stretch>
         </p:blipFill>
         <p:spPr>
           <a:xfrm>
-            <a:off x="4831492" y="2424498"/>
-            <a:ext cx="7154562" cy="4248021"/>
+            <a:off x="4708310" y="2780270"/>
+            <a:ext cx="7248525" cy="3712605"/>
           </a:xfrm>
           <a:prstGeom prst="rect">
             <a:avLst/>
@@ -7244,7 +7739,7 @@
     </p:spTree>
     <p:extLst>
       <p:ext uri="{BB962C8B-B14F-4D97-AF65-F5344CB8AC3E}">
-        <p14:creationId xmlns:p14="http://schemas.microsoft.com/office/powerpoint/2010/main" val="1377008299"/>
+        <p14:creationId xmlns:p14="http://schemas.microsoft.com/office/powerpoint/2010/main" val="2714511728"/>
       </p:ext>
     </p:extLst>
   </p:cSld>

</xml_diff>